<commit_message>
Minor addition to session #4
</commit_message>
<xml_diff>
--- a/fundamentals/4-Conditionals, Sequence, String.pptx
+++ b/fundamentals/4-Conditionals, Sequence, String.pptx
@@ -5,7 +5,7 @@
     <p:sldMasterId id="2147483954" r:id="rId1"/>
   </p:sldMasterIdLst>
   <p:notesMasterIdLst>
-    <p:notesMasterId r:id="rId21"/>
+    <p:notesMasterId r:id="rId22"/>
   </p:notesMasterIdLst>
   <p:sldIdLst>
     <p:sldId id="277" r:id="rId2"/>
@@ -20,13 +20,14 @@
     <p:sldId id="283" r:id="rId11"/>
     <p:sldId id="275" r:id="rId12"/>
     <p:sldId id="291" r:id="rId13"/>
-    <p:sldId id="288" r:id="rId14"/>
-    <p:sldId id="284" r:id="rId15"/>
-    <p:sldId id="285" r:id="rId16"/>
-    <p:sldId id="271" r:id="rId17"/>
-    <p:sldId id="282" r:id="rId18"/>
-    <p:sldId id="270" r:id="rId19"/>
-    <p:sldId id="281" r:id="rId20"/>
+    <p:sldId id="292" r:id="rId14"/>
+    <p:sldId id="288" r:id="rId15"/>
+    <p:sldId id="284" r:id="rId16"/>
+    <p:sldId id="285" r:id="rId17"/>
+    <p:sldId id="271" r:id="rId18"/>
+    <p:sldId id="282" r:id="rId19"/>
+    <p:sldId id="270" r:id="rId20"/>
+    <p:sldId id="281" r:id="rId21"/>
   </p:sldIdLst>
   <p:sldSz cx="12192000" cy="6858000"/>
   <p:notesSz cx="6858000" cy="9144000"/>
@@ -7653,6 +7654,576 @@
       </p:grpSpPr>
       <p:sp>
         <p:nvSpPr>
+          <p:cNvPr id="4" name="Content Placeholder 2">
+            <a:extLst>
+              <a:ext uri="{FF2B5EF4-FFF2-40B4-BE49-F238E27FC236}">
+                <a16:creationId xmlns:a16="http://schemas.microsoft.com/office/drawing/2014/main" id="{61603BA8-FA4A-6046-B013-96639C005D4F}"/>
+              </a:ext>
+            </a:extLst>
+          </p:cNvPr>
+          <p:cNvSpPr txBox="1">
+            <a:spLocks/>
+          </p:cNvSpPr>
+          <p:nvPr/>
+        </p:nvSpPr>
+        <p:spPr>
+          <a:xfrm>
+            <a:off x="566530" y="1739348"/>
+            <a:ext cx="11151705" cy="4701208"/>
+          </a:xfrm>
+          <a:prstGeom prst="rect">
+            <a:avLst/>
+          </a:prstGeom>
+        </p:spPr>
+        <p:txBody>
+          <a:bodyPr vert="horz" lIns="91440" tIns="45720" rIns="91440" bIns="45720" rtlCol="0">
+            <a:normAutofit/>
+          </a:bodyPr>
+          <a:lstStyle>
+            <a:lvl1pPr marL="228600" indent="-228600" algn="l" defTabSz="914400" rtl="0" eaLnBrk="1" latinLnBrk="0" hangingPunct="1">
+              <a:lnSpc>
+                <a:spcPct val="90000"/>
+              </a:lnSpc>
+              <a:spcBef>
+                <a:spcPts val="1000"/>
+              </a:spcBef>
+              <a:buFont typeface="Arial" panose="020B0604020202020204" pitchFamily="34" charset="0"/>
+              <a:buChar char="•"/>
+              <a:defRPr sz="2800" kern="1200">
+                <a:solidFill>
+                  <a:schemeClr val="tx2">
+                    <a:lumMod val="75000"/>
+                  </a:schemeClr>
+                </a:solidFill>
+                <a:latin typeface="+mn-lt"/>
+                <a:ea typeface="+mn-ea"/>
+                <a:cs typeface="+mn-cs"/>
+              </a:defRPr>
+            </a:lvl1pPr>
+            <a:lvl2pPr marL="685800" indent="-228600" algn="l" defTabSz="914400" rtl="0" eaLnBrk="1" latinLnBrk="0" hangingPunct="1">
+              <a:lnSpc>
+                <a:spcPct val="90000"/>
+              </a:lnSpc>
+              <a:spcBef>
+                <a:spcPts val="500"/>
+              </a:spcBef>
+              <a:buFont typeface="Arial" panose="020B0604020202020204" pitchFamily="34" charset="0"/>
+              <a:buChar char="•"/>
+              <a:defRPr sz="2400" kern="1200">
+                <a:solidFill>
+                  <a:schemeClr val="tx2">
+                    <a:lumMod val="75000"/>
+                  </a:schemeClr>
+                </a:solidFill>
+                <a:latin typeface="+mn-lt"/>
+                <a:ea typeface="+mn-ea"/>
+                <a:cs typeface="+mn-cs"/>
+              </a:defRPr>
+            </a:lvl2pPr>
+            <a:lvl3pPr marL="1143000" indent="-228600" algn="l" defTabSz="914400" rtl="0" eaLnBrk="1" latinLnBrk="0" hangingPunct="1">
+              <a:lnSpc>
+                <a:spcPct val="90000"/>
+              </a:lnSpc>
+              <a:spcBef>
+                <a:spcPts val="500"/>
+              </a:spcBef>
+              <a:buFont typeface="Arial" panose="020B0604020202020204" pitchFamily="34" charset="0"/>
+              <a:buChar char="•"/>
+              <a:defRPr sz="2000" kern="1200">
+                <a:solidFill>
+                  <a:schemeClr val="tx2">
+                    <a:lumMod val="75000"/>
+                  </a:schemeClr>
+                </a:solidFill>
+                <a:latin typeface="+mn-lt"/>
+                <a:ea typeface="+mn-ea"/>
+                <a:cs typeface="+mn-cs"/>
+              </a:defRPr>
+            </a:lvl3pPr>
+            <a:lvl4pPr marL="1600200" indent="-228600" algn="l" defTabSz="914400" rtl="0" eaLnBrk="1" latinLnBrk="0" hangingPunct="1">
+              <a:lnSpc>
+                <a:spcPct val="90000"/>
+              </a:lnSpc>
+              <a:spcBef>
+                <a:spcPts val="500"/>
+              </a:spcBef>
+              <a:buFont typeface="Arial" panose="020B0604020202020204" pitchFamily="34" charset="0"/>
+              <a:buChar char="•"/>
+              <a:defRPr sz="1800" kern="1200">
+                <a:solidFill>
+                  <a:schemeClr val="tx2">
+                    <a:lumMod val="75000"/>
+                  </a:schemeClr>
+                </a:solidFill>
+                <a:latin typeface="+mn-lt"/>
+                <a:ea typeface="+mn-ea"/>
+                <a:cs typeface="+mn-cs"/>
+              </a:defRPr>
+            </a:lvl4pPr>
+            <a:lvl5pPr marL="2057400" indent="-228600" algn="l" defTabSz="914400" rtl="0" eaLnBrk="1" latinLnBrk="0" hangingPunct="1">
+              <a:lnSpc>
+                <a:spcPct val="90000"/>
+              </a:lnSpc>
+              <a:spcBef>
+                <a:spcPts val="500"/>
+              </a:spcBef>
+              <a:buFont typeface="Arial" panose="020B0604020202020204" pitchFamily="34" charset="0"/>
+              <a:buChar char="•"/>
+              <a:defRPr sz="1800" kern="1200">
+                <a:solidFill>
+                  <a:schemeClr val="tx2">
+                    <a:lumMod val="75000"/>
+                  </a:schemeClr>
+                </a:solidFill>
+                <a:latin typeface="+mn-lt"/>
+                <a:ea typeface="+mn-ea"/>
+                <a:cs typeface="+mn-cs"/>
+              </a:defRPr>
+            </a:lvl5pPr>
+            <a:lvl6pPr marL="2514600" indent="-228600" algn="l" defTabSz="914400" rtl="0" eaLnBrk="1" latinLnBrk="0" hangingPunct="1">
+              <a:lnSpc>
+                <a:spcPct val="90000"/>
+              </a:lnSpc>
+              <a:spcBef>
+                <a:spcPts val="500"/>
+              </a:spcBef>
+              <a:buFont typeface="Arial" panose="020B0604020202020204" pitchFamily="34" charset="0"/>
+              <a:buChar char="•"/>
+              <a:defRPr sz="1800" kern="1200">
+                <a:solidFill>
+                  <a:schemeClr val="tx1"/>
+                </a:solidFill>
+                <a:latin typeface="+mn-lt"/>
+                <a:ea typeface="+mn-ea"/>
+                <a:cs typeface="+mn-cs"/>
+              </a:defRPr>
+            </a:lvl6pPr>
+            <a:lvl7pPr marL="2971800" indent="-228600" algn="l" defTabSz="914400" rtl="0" eaLnBrk="1" latinLnBrk="0" hangingPunct="1">
+              <a:lnSpc>
+                <a:spcPct val="90000"/>
+              </a:lnSpc>
+              <a:spcBef>
+                <a:spcPts val="500"/>
+              </a:spcBef>
+              <a:buFont typeface="Arial" panose="020B0604020202020204" pitchFamily="34" charset="0"/>
+              <a:buChar char="•"/>
+              <a:defRPr sz="1800" kern="1200">
+                <a:solidFill>
+                  <a:schemeClr val="tx1"/>
+                </a:solidFill>
+                <a:latin typeface="+mn-lt"/>
+                <a:ea typeface="+mn-ea"/>
+                <a:cs typeface="+mn-cs"/>
+              </a:defRPr>
+            </a:lvl7pPr>
+            <a:lvl8pPr marL="3429000" indent="-228600" algn="l" defTabSz="914400" rtl="0" eaLnBrk="1" latinLnBrk="0" hangingPunct="1">
+              <a:lnSpc>
+                <a:spcPct val="90000"/>
+              </a:lnSpc>
+              <a:spcBef>
+                <a:spcPts val="500"/>
+              </a:spcBef>
+              <a:buFont typeface="Arial" panose="020B0604020202020204" pitchFamily="34" charset="0"/>
+              <a:buChar char="•"/>
+              <a:defRPr sz="1800" kern="1200">
+                <a:solidFill>
+                  <a:schemeClr val="tx1"/>
+                </a:solidFill>
+                <a:latin typeface="+mn-lt"/>
+                <a:ea typeface="+mn-ea"/>
+                <a:cs typeface="+mn-cs"/>
+              </a:defRPr>
+            </a:lvl8pPr>
+            <a:lvl9pPr marL="3886200" indent="-228600" algn="l" defTabSz="914400" rtl="0" eaLnBrk="1" latinLnBrk="0" hangingPunct="1">
+              <a:lnSpc>
+                <a:spcPct val="90000"/>
+              </a:lnSpc>
+              <a:spcBef>
+                <a:spcPts val="500"/>
+              </a:spcBef>
+              <a:buFont typeface="Arial" panose="020B0604020202020204" pitchFamily="34" charset="0"/>
+              <a:buChar char="•"/>
+              <a:defRPr sz="1800" kern="1200">
+                <a:solidFill>
+                  <a:schemeClr val="tx1"/>
+                </a:solidFill>
+                <a:latin typeface="+mn-lt"/>
+                <a:ea typeface="+mn-ea"/>
+                <a:cs typeface="+mn-cs"/>
+              </a:defRPr>
+            </a:lvl9pPr>
+          </a:lstStyle>
+          <a:p>
+            <a:pPr marL="0" indent="0">
+              <a:buFont typeface="Arial" panose="020B0604020202020204" pitchFamily="34" charset="0"/>
+              <a:buNone/>
+            </a:pPr>
+            <a:r>
+              <a:rPr lang="en-US" dirty="0">
+                <a:latin typeface="Consolas" panose="020B0609020204030204" pitchFamily="49" charset="0"/>
+                <a:cs typeface="Consolas" panose="020B0609020204030204" pitchFamily="49" charset="0"/>
+              </a:rPr>
+              <a:t>name: str = “learn”</a:t>
+            </a:r>
+          </a:p>
+          <a:p>
+            <a:pPr marL="0" indent="0">
+              <a:buFont typeface="Arial" panose="020B0604020202020204" pitchFamily="34" charset="0"/>
+              <a:buNone/>
+            </a:pPr>
+            <a:r>
+              <a:rPr lang="en-US" dirty="0">
+                <a:latin typeface="Consolas" panose="020B0609020204030204" pitchFamily="49" charset="0"/>
+                <a:cs typeface="Consolas" panose="020B0609020204030204" pitchFamily="49" charset="0"/>
+              </a:rPr>
+              <a:t>for index, letter in enumerate(name):	</a:t>
+            </a:r>
+            <a:endParaRPr lang="en-US" sz="2400" dirty="0">
+              <a:solidFill>
+                <a:srgbClr val="D06A22"/>
+              </a:solidFill>
+              <a:latin typeface="Consolas" panose="020B0609020204030204" pitchFamily="49" charset="0"/>
+              <a:cs typeface="Consolas" panose="020B0609020204030204" pitchFamily="49" charset="0"/>
+            </a:endParaRPr>
+          </a:p>
+          <a:p>
+            <a:pPr marL="457200" lvl="1" indent="0">
+              <a:buFont typeface="Arial" panose="020B0604020202020204" pitchFamily="34" charset="0"/>
+              <a:buNone/>
+            </a:pPr>
+            <a:r>
+              <a:rPr lang="en-US" sz="2800" dirty="0">
+                <a:latin typeface="Consolas" panose="020B0609020204030204" pitchFamily="49" charset="0"/>
+                <a:cs typeface="Consolas" panose="020B0609020204030204" pitchFamily="49" charset="0"/>
+              </a:rPr>
+              <a:t>print (“{}: {}”.format(index, letter))</a:t>
+            </a:r>
+          </a:p>
+          <a:p>
+            <a:pPr marL="457200" lvl="1" indent="0">
+              <a:buFont typeface="Arial" panose="020B0604020202020204" pitchFamily="34" charset="0"/>
+              <a:buNone/>
+            </a:pPr>
+            <a:endParaRPr lang="en-US" dirty="0">
+              <a:latin typeface="Consolas" panose="020B0609020204030204" pitchFamily="49" charset="0"/>
+              <a:cs typeface="Consolas" panose="020B0609020204030204" pitchFamily="49" charset="0"/>
+            </a:endParaRPr>
+          </a:p>
+          <a:p>
+            <a:pPr marL="457200" lvl="1" indent="0">
+              <a:buFont typeface="Arial" panose="020B0604020202020204" pitchFamily="34" charset="0"/>
+              <a:buNone/>
+            </a:pPr>
+            <a:endParaRPr lang="en-US" dirty="0">
+              <a:latin typeface="Consolas" panose="020B0609020204030204" pitchFamily="49" charset="0"/>
+              <a:cs typeface="Consolas" panose="020B0609020204030204" pitchFamily="49" charset="0"/>
+            </a:endParaRPr>
+          </a:p>
+        </p:txBody>
+      </p:sp>
+      <p:sp>
+        <p:nvSpPr>
+          <p:cNvPr id="5" name="TextBox 4">
+            <a:extLst>
+              <a:ext uri="{FF2B5EF4-FFF2-40B4-BE49-F238E27FC236}">
+                <a16:creationId xmlns:a16="http://schemas.microsoft.com/office/drawing/2014/main" id="{5CDBC3AD-D627-1745-8DF8-75AB54025850}"/>
+              </a:ext>
+            </a:extLst>
+          </p:cNvPr>
+          <p:cNvSpPr txBox="1"/>
+          <p:nvPr/>
+        </p:nvSpPr>
+        <p:spPr>
+          <a:xfrm>
+            <a:off x="708582" y="3610744"/>
+            <a:ext cx="6769802" cy="646331"/>
+          </a:xfrm>
+          <a:prstGeom prst="rect">
+            <a:avLst/>
+          </a:prstGeom>
+          <a:noFill/>
+        </p:spPr>
+        <p:txBody>
+          <a:bodyPr wrap="none" rtlCol="0">
+            <a:spAutoFit/>
+          </a:bodyPr>
+          <a:lstStyle/>
+          <a:p>
+            <a:r>
+              <a:rPr lang="en-US" dirty="0">
+                <a:solidFill>
+                  <a:srgbClr val="D06A22"/>
+                </a:solidFill>
+                <a:latin typeface="Consolas" panose="020B0609020204030204" pitchFamily="49" charset="0"/>
+                <a:cs typeface="Consolas" panose="020B0609020204030204" pitchFamily="49" charset="0"/>
+              </a:rPr>
+              <a:t># Two variables called </a:t>
+            </a:r>
+            <a:r>
+              <a:rPr lang="en-US" b="1" dirty="0">
+                <a:solidFill>
+                  <a:srgbClr val="D06A22"/>
+                </a:solidFill>
+                <a:latin typeface="Consolas" panose="020B0609020204030204" pitchFamily="49" charset="0"/>
+                <a:cs typeface="Consolas" panose="020B0609020204030204" pitchFamily="49" charset="0"/>
+              </a:rPr>
+              <a:t>index </a:t>
+            </a:r>
+            <a:r>
+              <a:rPr lang="en-US" dirty="0">
+                <a:solidFill>
+                  <a:srgbClr val="D06A22"/>
+                </a:solidFill>
+                <a:latin typeface="Consolas" panose="020B0609020204030204" pitchFamily="49" charset="0"/>
+                <a:cs typeface="Consolas" panose="020B0609020204030204" pitchFamily="49" charset="0"/>
+              </a:rPr>
+              <a:t>and </a:t>
+            </a:r>
+            <a:r>
+              <a:rPr lang="en-US" b="1" dirty="0">
+                <a:solidFill>
+                  <a:srgbClr val="D06A22"/>
+                </a:solidFill>
+                <a:latin typeface="Consolas" panose="020B0609020204030204" pitchFamily="49" charset="0"/>
+                <a:cs typeface="Consolas" panose="020B0609020204030204" pitchFamily="49" charset="0"/>
+              </a:rPr>
+              <a:t>letter are</a:t>
+            </a:r>
+            <a:r>
+              <a:rPr lang="en-US" dirty="0">
+                <a:solidFill>
+                  <a:srgbClr val="D06A22"/>
+                </a:solidFill>
+                <a:latin typeface="Consolas" panose="020B0609020204030204" pitchFamily="49" charset="0"/>
+                <a:cs typeface="Consolas" panose="020B0609020204030204" pitchFamily="49" charset="0"/>
+              </a:rPr>
+              <a:t> created </a:t>
+            </a:r>
+          </a:p>
+          <a:p>
+            <a:r>
+              <a:rPr lang="en-US" dirty="0">
+                <a:solidFill>
+                  <a:srgbClr val="D06A22"/>
+                </a:solidFill>
+                <a:latin typeface="Consolas" panose="020B0609020204030204" pitchFamily="49" charset="0"/>
+                <a:cs typeface="Consolas" panose="020B0609020204030204" pitchFamily="49" charset="0"/>
+              </a:rPr>
+              <a:t>which are valid </a:t>
+            </a:r>
+            <a:r>
+              <a:rPr lang="en-US" i="1" dirty="0">
+                <a:solidFill>
+                  <a:srgbClr val="D06A22"/>
+                </a:solidFill>
+                <a:latin typeface="Consolas" panose="020B0609020204030204" pitchFamily="49" charset="0"/>
+                <a:cs typeface="Consolas" panose="020B0609020204030204" pitchFamily="49" charset="0"/>
+              </a:rPr>
+              <a:t>only inside the for loop</a:t>
+            </a:r>
+            <a:endParaRPr lang="en-US" dirty="0"/>
+          </a:p>
+        </p:txBody>
+      </p:sp>
+      <p:sp>
+        <p:nvSpPr>
+          <p:cNvPr id="8" name="TextBox 7">
+            <a:extLst>
+              <a:ext uri="{FF2B5EF4-FFF2-40B4-BE49-F238E27FC236}">
+                <a16:creationId xmlns:a16="http://schemas.microsoft.com/office/drawing/2014/main" id="{2E09E391-5928-694D-A77F-DC322D6DD10C}"/>
+              </a:ext>
+            </a:extLst>
+          </p:cNvPr>
+          <p:cNvSpPr txBox="1"/>
+          <p:nvPr/>
+        </p:nvSpPr>
+        <p:spPr>
+          <a:xfrm>
+            <a:off x="566530" y="657822"/>
+            <a:ext cx="7685758" cy="769441"/>
+          </a:xfrm>
+          <a:prstGeom prst="rect">
+            <a:avLst/>
+          </a:prstGeom>
+          <a:noFill/>
+        </p:spPr>
+        <p:txBody>
+          <a:bodyPr wrap="none" rtlCol="0">
+            <a:spAutoFit/>
+          </a:bodyPr>
+          <a:lstStyle/>
+          <a:p>
+            <a:r>
+              <a:rPr lang="en-US" sz="4400" dirty="0">
+                <a:solidFill>
+                  <a:schemeClr val="tx2">
+                    <a:lumMod val="75000"/>
+                  </a:schemeClr>
+                </a:solidFill>
+                <a:latin typeface="+mj-lt"/>
+              </a:rPr>
+              <a:t>Another popular use of </a:t>
+            </a:r>
+            <a:r>
+              <a:rPr lang="en-US" sz="4400" dirty="0">
+                <a:solidFill>
+                  <a:schemeClr val="tx2">
+                    <a:lumMod val="75000"/>
+                  </a:schemeClr>
+                </a:solidFill>
+                <a:latin typeface="+mj-lt"/>
+                <a:cs typeface="Consolas" panose="020B0609020204030204" pitchFamily="49" charset="0"/>
+              </a:rPr>
+              <a:t>for()</a:t>
+            </a:r>
+            <a:r>
+              <a:rPr lang="en-US" sz="4400" dirty="0">
+                <a:solidFill>
+                  <a:schemeClr val="tx2">
+                    <a:lumMod val="75000"/>
+                  </a:schemeClr>
+                </a:solidFill>
+                <a:latin typeface="+mj-lt"/>
+              </a:rPr>
+              <a:t> loop</a:t>
+            </a:r>
+          </a:p>
+        </p:txBody>
+      </p:sp>
+      <p:sp>
+        <p:nvSpPr>
+          <p:cNvPr id="9" name="TextBox 8">
+            <a:extLst>
+              <a:ext uri="{FF2B5EF4-FFF2-40B4-BE49-F238E27FC236}">
+                <a16:creationId xmlns:a16="http://schemas.microsoft.com/office/drawing/2014/main" id="{921651EE-04EC-3F4A-9AB3-D8CC7BE33F7A}"/>
+              </a:ext>
+            </a:extLst>
+          </p:cNvPr>
+          <p:cNvSpPr txBox="1"/>
+          <p:nvPr/>
+        </p:nvSpPr>
+        <p:spPr>
+          <a:xfrm>
+            <a:off x="4409409" y="4501564"/>
+            <a:ext cx="652743" cy="1938992"/>
+          </a:xfrm>
+          <a:prstGeom prst="rect">
+            <a:avLst/>
+          </a:prstGeom>
+        </p:spPr>
+        <p:style>
+          <a:lnRef idx="2">
+            <a:schemeClr val="accent2"/>
+          </a:lnRef>
+          <a:fillRef idx="1">
+            <a:schemeClr val="lt1"/>
+          </a:fillRef>
+          <a:effectRef idx="0">
+            <a:schemeClr val="accent2"/>
+          </a:effectRef>
+          <a:fontRef idx="minor">
+            <a:schemeClr val="dk1"/>
+          </a:fontRef>
+        </p:style>
+        <p:txBody>
+          <a:bodyPr wrap="none" rtlCol="0">
+            <a:spAutoFit/>
+          </a:bodyPr>
+          <a:lstStyle/>
+          <a:p>
+            <a:r>
+              <a:rPr lang="en-GB" sz="2400" dirty="0">
+                <a:solidFill>
+                  <a:schemeClr val="tx2">
+                    <a:lumMod val="75000"/>
+                  </a:schemeClr>
+                </a:solidFill>
+              </a:rPr>
+              <a:t>0: l</a:t>
+            </a:r>
+          </a:p>
+          <a:p>
+            <a:r>
+              <a:rPr lang="en-GB" sz="2400" dirty="0">
+                <a:solidFill>
+                  <a:schemeClr val="tx2">
+                    <a:lumMod val="75000"/>
+                  </a:schemeClr>
+                </a:solidFill>
+              </a:rPr>
+              <a:t>1: e</a:t>
+            </a:r>
+          </a:p>
+          <a:p>
+            <a:r>
+              <a:rPr lang="en-GB" sz="2400" dirty="0">
+                <a:solidFill>
+                  <a:schemeClr val="tx2">
+                    <a:lumMod val="75000"/>
+                  </a:schemeClr>
+                </a:solidFill>
+              </a:rPr>
+              <a:t>2: a</a:t>
+            </a:r>
+          </a:p>
+          <a:p>
+            <a:r>
+              <a:rPr lang="en-GB" sz="2400" dirty="0">
+                <a:solidFill>
+                  <a:schemeClr val="tx2">
+                    <a:lumMod val="75000"/>
+                  </a:schemeClr>
+                </a:solidFill>
+              </a:rPr>
+              <a:t>3: r</a:t>
+            </a:r>
+          </a:p>
+          <a:p>
+            <a:r>
+              <a:rPr lang="en-GB" sz="2400" dirty="0">
+                <a:solidFill>
+                  <a:schemeClr val="tx2">
+                    <a:lumMod val="75000"/>
+                  </a:schemeClr>
+                </a:solidFill>
+              </a:rPr>
+              <a:t>4: n</a:t>
+            </a:r>
+          </a:p>
+        </p:txBody>
+      </p:sp>
+    </p:spTree>
+    <p:extLst>
+      <p:ext uri="{BB962C8B-B14F-4D97-AF65-F5344CB8AC3E}">
+        <p14:creationId xmlns:p14="http://schemas.microsoft.com/office/powerpoint/2010/main" val="3185746204"/>
+      </p:ext>
+    </p:extLst>
+  </p:cSld>
+  <p:clrMapOvr>
+    <a:masterClrMapping/>
+  </p:clrMapOvr>
+</p:sld>
+</file>
+
+<file path=ppt/slides/slide14.xml><?xml version="1.0" encoding="utf-8"?>
+<p:sld xmlns:a="http://schemas.openxmlformats.org/drawingml/2006/main" xmlns:r="http://schemas.openxmlformats.org/officeDocument/2006/relationships" xmlns:p="http://schemas.openxmlformats.org/presentationml/2006/main">
+  <p:cSld>
+    <p:spTree>
+      <p:nvGrpSpPr>
+        <p:cNvPr id="1" name=""/>
+        <p:cNvGrpSpPr/>
+        <p:nvPr/>
+      </p:nvGrpSpPr>
+      <p:grpSpPr>
+        <a:xfrm>
+          <a:off x="0" y="0"/>
+          <a:ext cx="0" cy="0"/>
+          <a:chOff x="0" y="0"/>
+          <a:chExt cx="0" cy="0"/>
+        </a:xfrm>
+      </p:grpSpPr>
+      <p:sp>
+        <p:nvSpPr>
           <p:cNvPr id="2" name="Title 1">
             <a:extLst>
               <a:ext uri="{FF2B5EF4-FFF2-40B4-BE49-F238E27FC236}">
@@ -7780,7 +8351,7 @@
 </p:sld>
 </file>
 
-<file path=ppt/slides/slide14.xml><?xml version="1.0" encoding="utf-8"?>
+<file path=ppt/slides/slide15.xml><?xml version="1.0" encoding="utf-8"?>
 <p:sld xmlns:a="http://schemas.openxmlformats.org/drawingml/2006/main" xmlns:r="http://schemas.openxmlformats.org/officeDocument/2006/relationships" xmlns:p="http://schemas.openxmlformats.org/presentationml/2006/main">
   <p:cSld>
     <p:bg>
@@ -8426,7 +8997,7 @@
 </p:sld>
 </file>
 
-<file path=ppt/slides/slide15.xml><?xml version="1.0" encoding="utf-8"?>
+<file path=ppt/slides/slide16.xml><?xml version="1.0" encoding="utf-8"?>
 <p:sld xmlns:a="http://schemas.openxmlformats.org/drawingml/2006/main" xmlns:r="http://schemas.openxmlformats.org/officeDocument/2006/relationships" xmlns:p="http://schemas.openxmlformats.org/presentationml/2006/main">
   <p:cSld>
     <p:bg>
@@ -8940,7 +9511,7 @@
 </p:sld>
 </file>
 
-<file path=ppt/slides/slide16.xml><?xml version="1.0" encoding="utf-8"?>
+<file path=ppt/slides/slide17.xml><?xml version="1.0" encoding="utf-8"?>
 <p:sld xmlns:a="http://schemas.openxmlformats.org/drawingml/2006/main" xmlns:r="http://schemas.openxmlformats.org/officeDocument/2006/relationships" xmlns:p="http://schemas.openxmlformats.org/presentationml/2006/main">
   <p:cSld>
     <p:bg>
@@ -9234,7 +9805,7 @@
 </p:sld>
 </file>
 
-<file path=ppt/slides/slide17.xml><?xml version="1.0" encoding="utf-8"?>
+<file path=ppt/slides/slide18.xml><?xml version="1.0" encoding="utf-8"?>
 <p:sld xmlns:a="http://schemas.openxmlformats.org/drawingml/2006/main" xmlns:r="http://schemas.openxmlformats.org/officeDocument/2006/relationships" xmlns:p="http://schemas.openxmlformats.org/presentationml/2006/main">
   <p:cSld>
     <p:bg>
@@ -9809,7 +10380,7 @@
 </p:sld>
 </file>
 
-<file path=ppt/slides/slide18.xml><?xml version="1.0" encoding="utf-8"?>
+<file path=ppt/slides/slide19.xml><?xml version="1.0" encoding="utf-8"?>
 <p:sld xmlns:a="http://schemas.openxmlformats.org/drawingml/2006/main" xmlns:r="http://schemas.openxmlformats.org/officeDocument/2006/relationships" xmlns:p="http://schemas.openxmlformats.org/presentationml/2006/main">
   <p:cSld>
     <p:bg>
@@ -10093,225 +10664,6 @@
     <p:extLst>
       <p:ext uri="{BB962C8B-B14F-4D97-AF65-F5344CB8AC3E}">
         <p14:creationId xmlns:p14="http://schemas.microsoft.com/office/powerpoint/2010/main" val="3547435381"/>
-      </p:ext>
-    </p:extLst>
-  </p:cSld>
-  <p:clrMapOvr>
-    <a:masterClrMapping/>
-  </p:clrMapOvr>
-</p:sld>
-</file>
-
-<file path=ppt/slides/slide19.xml><?xml version="1.0" encoding="utf-8"?>
-<p:sld xmlns:a="http://schemas.openxmlformats.org/drawingml/2006/main" xmlns:r="http://schemas.openxmlformats.org/officeDocument/2006/relationships" xmlns:p="http://schemas.openxmlformats.org/presentationml/2006/main">
-  <p:cSld>
-    <p:bg>
-      <p:bgPr>
-        <a:solidFill>
-          <a:schemeClr val="bg1"/>
-        </a:solidFill>
-        <a:effectLst/>
-      </p:bgPr>
-    </p:bg>
-    <p:spTree>
-      <p:nvGrpSpPr>
-        <p:cNvPr id="1" name=""/>
-        <p:cNvGrpSpPr/>
-        <p:nvPr/>
-      </p:nvGrpSpPr>
-      <p:grpSpPr>
-        <a:xfrm>
-          <a:off x="0" y="0"/>
-          <a:ext cx="0" cy="0"/>
-          <a:chOff x="0" y="0"/>
-          <a:chExt cx="0" cy="0"/>
-        </a:xfrm>
-      </p:grpSpPr>
-      <p:sp>
-        <p:nvSpPr>
-          <p:cNvPr id="2" name="Title 1">
-            <a:extLst>
-              <a:ext uri="{FF2B5EF4-FFF2-40B4-BE49-F238E27FC236}">
-                <a16:creationId xmlns:a16="http://schemas.microsoft.com/office/drawing/2014/main" id="{8DED3A5E-6D47-7945-8979-EDDCBE8EA650}"/>
-              </a:ext>
-            </a:extLst>
-          </p:cNvPr>
-          <p:cNvSpPr>
-            <a:spLocks noGrp="1"/>
-          </p:cNvSpPr>
-          <p:nvPr>
-            <p:ph type="title"/>
-          </p:nvPr>
-        </p:nvSpPr>
-        <p:spPr>
-          <a:xfrm>
-            <a:off x="1175512" y="870132"/>
-            <a:ext cx="9792208" cy="1527078"/>
-          </a:xfrm>
-        </p:spPr>
-        <p:txBody>
-          <a:bodyPr>
-            <a:normAutofit/>
-          </a:bodyPr>
-          <a:lstStyle/>
-          <a:p>
-            <a:r>
-              <a:rPr lang="en-US" dirty="0"/>
-              <a:t>More …</a:t>
-            </a:r>
-          </a:p>
-        </p:txBody>
-      </p:sp>
-      <p:sp>
-        <p:nvSpPr>
-          <p:cNvPr id="3" name="Content Placeholder 2">
-            <a:extLst>
-              <a:ext uri="{FF2B5EF4-FFF2-40B4-BE49-F238E27FC236}">
-                <a16:creationId xmlns:a16="http://schemas.microsoft.com/office/drawing/2014/main" id="{304FD98E-054E-4B4F-9BB4-1D9993EBB99F}"/>
-              </a:ext>
-            </a:extLst>
-          </p:cNvPr>
-          <p:cNvSpPr>
-            <a:spLocks noGrp="1"/>
-          </p:cNvSpPr>
-          <p:nvPr>
-            <p:ph idx="1"/>
-          </p:nvPr>
-        </p:nvSpPr>
-        <p:spPr>
-          <a:xfrm>
-            <a:off x="1175512" y="2557849"/>
-            <a:ext cx="9792208" cy="3407862"/>
-          </a:xfrm>
-        </p:spPr>
-        <p:txBody>
-          <a:bodyPr>
-            <a:normAutofit fontScale="92500" lnSpcReduction="10000"/>
-          </a:bodyPr>
-          <a:lstStyle/>
-          <a:p>
-            <a:r>
-              <a:rPr lang="en-US" dirty="0">
-                <a:solidFill>
-                  <a:schemeClr val="tx2">
-                    <a:lumMod val="75000"/>
-                  </a:schemeClr>
-                </a:solidFill>
-              </a:rPr>
-              <a:t>Print all command-line arguments</a:t>
-            </a:r>
-          </a:p>
-          <a:p>
-            <a:r>
-              <a:rPr lang="en-US" dirty="0">
-                <a:solidFill>
-                  <a:schemeClr val="tx2">
-                    <a:lumMod val="75000"/>
-                  </a:schemeClr>
-                </a:solidFill>
-              </a:rPr>
-              <a:t>Print the number of command-line arguments </a:t>
-            </a:r>
-          </a:p>
-          <a:p>
-            <a:r>
-              <a:rPr lang="en-US" dirty="0">
-                <a:solidFill>
-                  <a:schemeClr val="tx2">
-                    <a:lumMod val="75000"/>
-                  </a:schemeClr>
-                </a:solidFill>
-              </a:rPr>
-              <a:t>Take a string as input to program</a:t>
-            </a:r>
-          </a:p>
-          <a:p>
-            <a:pPr lvl="1"/>
-            <a:r>
-              <a:rPr lang="en-US" dirty="0">
-                <a:solidFill>
-                  <a:schemeClr val="tx2">
-                    <a:lumMod val="75000"/>
-                  </a:schemeClr>
-                </a:solidFill>
-              </a:rPr>
-              <a:t>Check if the input string is empty</a:t>
-            </a:r>
-          </a:p>
-          <a:p>
-            <a:pPr lvl="1"/>
-            <a:r>
-              <a:rPr lang="en-US" dirty="0">
-                <a:solidFill>
-                  <a:schemeClr val="tx2">
-                    <a:lumMod val="75000"/>
-                  </a:schemeClr>
-                </a:solidFill>
-              </a:rPr>
-              <a:t>Print that string</a:t>
-            </a:r>
-          </a:p>
-          <a:p>
-            <a:pPr lvl="1"/>
-            <a:r>
-              <a:rPr lang="en-US" dirty="0">
-                <a:solidFill>
-                  <a:schemeClr val="tx2">
-                    <a:lumMod val="75000"/>
-                  </a:schemeClr>
-                </a:solidFill>
-              </a:rPr>
-              <a:t>Print reversed string</a:t>
-            </a:r>
-          </a:p>
-          <a:p>
-            <a:pPr lvl="1"/>
-            <a:r>
-              <a:rPr lang="en-US" dirty="0">
-                <a:solidFill>
-                  <a:schemeClr val="tx2">
-                    <a:lumMod val="75000"/>
-                  </a:schemeClr>
-                </a:solidFill>
-              </a:rPr>
-              <a:t>Print alternate characters in that string, starting from index 0</a:t>
-            </a:r>
-          </a:p>
-          <a:p>
-            <a:pPr lvl="1"/>
-            <a:r>
-              <a:rPr lang="en-US" dirty="0">
-                <a:solidFill>
-                  <a:schemeClr val="tx2">
-                    <a:lumMod val="75000"/>
-                  </a:schemeClr>
-                </a:solidFill>
-              </a:rPr>
-              <a:t>Print alternate characters in that string, starting from index 1</a:t>
-            </a:r>
-          </a:p>
-          <a:p>
-            <a:pPr lvl="1"/>
-            <a:r>
-              <a:rPr lang="en-US" dirty="0">
-                <a:solidFill>
-                  <a:schemeClr val="tx2">
-                    <a:lumMod val="75000"/>
-                  </a:schemeClr>
-                </a:solidFill>
-              </a:rPr>
-              <a:t>Check if that string is palindrome</a:t>
-            </a:r>
-          </a:p>
-          <a:p>
-            <a:endParaRPr lang="en-US" dirty="0"/>
-          </a:p>
-        </p:txBody>
-      </p:sp>
-    </p:spTree>
-    <p:extLst>
-      <p:ext uri="{BB962C8B-B14F-4D97-AF65-F5344CB8AC3E}">
-        <p14:creationId xmlns:p14="http://schemas.microsoft.com/office/powerpoint/2010/main" val="4131311411"/>
       </p:ext>
     </p:extLst>
   </p:cSld>
@@ -10818,6 +11170,225 @@
 </p:sld>
 </file>
 
+<file path=ppt/slides/slide20.xml><?xml version="1.0" encoding="utf-8"?>
+<p:sld xmlns:a="http://schemas.openxmlformats.org/drawingml/2006/main" xmlns:r="http://schemas.openxmlformats.org/officeDocument/2006/relationships" xmlns:p="http://schemas.openxmlformats.org/presentationml/2006/main">
+  <p:cSld>
+    <p:bg>
+      <p:bgPr>
+        <a:solidFill>
+          <a:schemeClr val="bg1"/>
+        </a:solidFill>
+        <a:effectLst/>
+      </p:bgPr>
+    </p:bg>
+    <p:spTree>
+      <p:nvGrpSpPr>
+        <p:cNvPr id="1" name=""/>
+        <p:cNvGrpSpPr/>
+        <p:nvPr/>
+      </p:nvGrpSpPr>
+      <p:grpSpPr>
+        <a:xfrm>
+          <a:off x="0" y="0"/>
+          <a:ext cx="0" cy="0"/>
+          <a:chOff x="0" y="0"/>
+          <a:chExt cx="0" cy="0"/>
+        </a:xfrm>
+      </p:grpSpPr>
+      <p:sp>
+        <p:nvSpPr>
+          <p:cNvPr id="2" name="Title 1">
+            <a:extLst>
+              <a:ext uri="{FF2B5EF4-FFF2-40B4-BE49-F238E27FC236}">
+                <a16:creationId xmlns:a16="http://schemas.microsoft.com/office/drawing/2014/main" id="{8DED3A5E-6D47-7945-8979-EDDCBE8EA650}"/>
+              </a:ext>
+            </a:extLst>
+          </p:cNvPr>
+          <p:cNvSpPr>
+            <a:spLocks noGrp="1"/>
+          </p:cNvSpPr>
+          <p:nvPr>
+            <p:ph type="title"/>
+          </p:nvPr>
+        </p:nvSpPr>
+        <p:spPr>
+          <a:xfrm>
+            <a:off x="1175512" y="870132"/>
+            <a:ext cx="9792208" cy="1527078"/>
+          </a:xfrm>
+        </p:spPr>
+        <p:txBody>
+          <a:bodyPr>
+            <a:normAutofit/>
+          </a:bodyPr>
+          <a:lstStyle/>
+          <a:p>
+            <a:r>
+              <a:rPr lang="en-US" dirty="0"/>
+              <a:t>More …</a:t>
+            </a:r>
+          </a:p>
+        </p:txBody>
+      </p:sp>
+      <p:sp>
+        <p:nvSpPr>
+          <p:cNvPr id="3" name="Content Placeholder 2">
+            <a:extLst>
+              <a:ext uri="{FF2B5EF4-FFF2-40B4-BE49-F238E27FC236}">
+                <a16:creationId xmlns:a16="http://schemas.microsoft.com/office/drawing/2014/main" id="{304FD98E-054E-4B4F-9BB4-1D9993EBB99F}"/>
+              </a:ext>
+            </a:extLst>
+          </p:cNvPr>
+          <p:cNvSpPr>
+            <a:spLocks noGrp="1"/>
+          </p:cNvSpPr>
+          <p:nvPr>
+            <p:ph idx="1"/>
+          </p:nvPr>
+        </p:nvSpPr>
+        <p:spPr>
+          <a:xfrm>
+            <a:off x="1175512" y="2557849"/>
+            <a:ext cx="9792208" cy="3407862"/>
+          </a:xfrm>
+        </p:spPr>
+        <p:txBody>
+          <a:bodyPr>
+            <a:normAutofit fontScale="92500" lnSpcReduction="10000"/>
+          </a:bodyPr>
+          <a:lstStyle/>
+          <a:p>
+            <a:r>
+              <a:rPr lang="en-US" dirty="0">
+                <a:solidFill>
+                  <a:schemeClr val="tx2">
+                    <a:lumMod val="75000"/>
+                  </a:schemeClr>
+                </a:solidFill>
+              </a:rPr>
+              <a:t>Print all command-line arguments</a:t>
+            </a:r>
+          </a:p>
+          <a:p>
+            <a:r>
+              <a:rPr lang="en-US" dirty="0">
+                <a:solidFill>
+                  <a:schemeClr val="tx2">
+                    <a:lumMod val="75000"/>
+                  </a:schemeClr>
+                </a:solidFill>
+              </a:rPr>
+              <a:t>Print the number of command-line arguments </a:t>
+            </a:r>
+          </a:p>
+          <a:p>
+            <a:r>
+              <a:rPr lang="en-US" dirty="0">
+                <a:solidFill>
+                  <a:schemeClr val="tx2">
+                    <a:lumMod val="75000"/>
+                  </a:schemeClr>
+                </a:solidFill>
+              </a:rPr>
+              <a:t>Take a string as input to program</a:t>
+            </a:r>
+          </a:p>
+          <a:p>
+            <a:pPr lvl="1"/>
+            <a:r>
+              <a:rPr lang="en-US" dirty="0">
+                <a:solidFill>
+                  <a:schemeClr val="tx2">
+                    <a:lumMod val="75000"/>
+                  </a:schemeClr>
+                </a:solidFill>
+              </a:rPr>
+              <a:t>Check if the input string is empty</a:t>
+            </a:r>
+          </a:p>
+          <a:p>
+            <a:pPr lvl="1"/>
+            <a:r>
+              <a:rPr lang="en-US" dirty="0">
+                <a:solidFill>
+                  <a:schemeClr val="tx2">
+                    <a:lumMod val="75000"/>
+                  </a:schemeClr>
+                </a:solidFill>
+              </a:rPr>
+              <a:t>Print that string</a:t>
+            </a:r>
+          </a:p>
+          <a:p>
+            <a:pPr lvl="1"/>
+            <a:r>
+              <a:rPr lang="en-US" dirty="0">
+                <a:solidFill>
+                  <a:schemeClr val="tx2">
+                    <a:lumMod val="75000"/>
+                  </a:schemeClr>
+                </a:solidFill>
+              </a:rPr>
+              <a:t>Print reversed string</a:t>
+            </a:r>
+          </a:p>
+          <a:p>
+            <a:pPr lvl="1"/>
+            <a:r>
+              <a:rPr lang="en-US" dirty="0">
+                <a:solidFill>
+                  <a:schemeClr val="tx2">
+                    <a:lumMod val="75000"/>
+                  </a:schemeClr>
+                </a:solidFill>
+              </a:rPr>
+              <a:t>Print alternate characters in that string, starting from index 0</a:t>
+            </a:r>
+          </a:p>
+          <a:p>
+            <a:pPr lvl="1"/>
+            <a:r>
+              <a:rPr lang="en-US" dirty="0">
+                <a:solidFill>
+                  <a:schemeClr val="tx2">
+                    <a:lumMod val="75000"/>
+                  </a:schemeClr>
+                </a:solidFill>
+              </a:rPr>
+              <a:t>Print alternate characters in that string, starting from index 1</a:t>
+            </a:r>
+          </a:p>
+          <a:p>
+            <a:pPr lvl="1"/>
+            <a:r>
+              <a:rPr lang="en-US" dirty="0">
+                <a:solidFill>
+                  <a:schemeClr val="tx2">
+                    <a:lumMod val="75000"/>
+                  </a:schemeClr>
+                </a:solidFill>
+              </a:rPr>
+              <a:t>Check if that string is palindrome</a:t>
+            </a:r>
+          </a:p>
+          <a:p>
+            <a:endParaRPr lang="en-US" dirty="0"/>
+          </a:p>
+        </p:txBody>
+      </p:sp>
+    </p:spTree>
+    <p:extLst>
+      <p:ext uri="{BB962C8B-B14F-4D97-AF65-F5344CB8AC3E}">
+        <p14:creationId xmlns:p14="http://schemas.microsoft.com/office/powerpoint/2010/main" val="4131311411"/>
+      </p:ext>
+    </p:extLst>
+  </p:cSld>
+  <p:clrMapOvr>
+    <a:masterClrMapping/>
+  </p:clrMapOvr>
+</p:sld>
+</file>
+
 <file path=ppt/slides/slide3.xml><?xml version="1.0" encoding="utf-8"?>
 <p:sld xmlns:a="http://schemas.openxmlformats.org/drawingml/2006/main" xmlns:r="http://schemas.openxmlformats.org/officeDocument/2006/relationships" xmlns:p="http://schemas.openxmlformats.org/presentationml/2006/main">
   <p:cSld>
@@ -10837,6 +11408,34 @@
       </p:grpSpPr>
       <p:sp>
         <p:nvSpPr>
+          <p:cNvPr id="2" name="Title 1">
+            <a:extLst>
+              <a:ext uri="{FF2B5EF4-FFF2-40B4-BE49-F238E27FC236}">
+                <a16:creationId xmlns:a16="http://schemas.microsoft.com/office/drawing/2014/main" id="{18A42F3C-3D1A-C44B-AEAA-2963E7C66C5B}"/>
+              </a:ext>
+            </a:extLst>
+          </p:cNvPr>
+          <p:cNvSpPr>
+            <a:spLocks noGrp="1"/>
+          </p:cNvSpPr>
+          <p:nvPr>
+            <p:ph type="title"/>
+          </p:nvPr>
+        </p:nvSpPr>
+        <p:spPr/>
+        <p:txBody>
+          <a:bodyPr/>
+          <a:lstStyle/>
+          <a:p>
+            <a:r>
+              <a:rPr lang="en-US" b="1" dirty="0"/>
+              <a:t>while()</a:t>
+            </a:r>
+          </a:p>
+        </p:txBody>
+      </p:sp>
+      <p:sp>
+        <p:nvSpPr>
           <p:cNvPr id="3" name="Content Placeholder 2">
             <a:extLst>
               <a:ext uri="{FF2B5EF4-FFF2-40B4-BE49-F238E27FC236}">
@@ -10851,14 +11450,11 @@
             <p:ph idx="1"/>
           </p:nvPr>
         </p:nvSpPr>
-        <p:spPr>
-          <a:xfrm>
-            <a:off x="665922" y="526774"/>
-            <a:ext cx="10687878" cy="5650189"/>
-          </a:xfrm>
-        </p:spPr>
+        <p:spPr/>
         <p:txBody>
-          <a:bodyPr/>
+          <a:bodyPr>
+            <a:normAutofit fontScale="85000" lnSpcReduction="20000"/>
+          </a:bodyPr>
           <a:lstStyle/>
           <a:p>
             <a:pPr marL="514350" indent="-514350">

</xml_diff>

<commit_message>
Add Preamble and minor edits to session #4
</commit_message>
<xml_diff>
--- a/fundamentals/4-Conditionals, Sequence, String.pptx
+++ b/fundamentals/4-Conditionals, Sequence, String.pptx
@@ -8,15 +8,15 @@
     <p:notesMasterId r:id="rId22"/>
   </p:notesMasterIdLst>
   <p:sldIdLst>
-    <p:sldId id="277" r:id="rId2"/>
-    <p:sldId id="278" r:id="rId3"/>
-    <p:sldId id="286" r:id="rId4"/>
-    <p:sldId id="268" r:id="rId5"/>
-    <p:sldId id="287" r:id="rId6"/>
-    <p:sldId id="274" r:id="rId7"/>
-    <p:sldId id="289" r:id="rId8"/>
-    <p:sldId id="290" r:id="rId9"/>
-    <p:sldId id="256" r:id="rId10"/>
+    <p:sldId id="256" r:id="rId2"/>
+    <p:sldId id="277" r:id="rId3"/>
+    <p:sldId id="278" r:id="rId4"/>
+    <p:sldId id="286" r:id="rId5"/>
+    <p:sldId id="268" r:id="rId6"/>
+    <p:sldId id="287" r:id="rId7"/>
+    <p:sldId id="274" r:id="rId8"/>
+    <p:sldId id="289" r:id="rId9"/>
+    <p:sldId id="290" r:id="rId10"/>
     <p:sldId id="283" r:id="rId11"/>
     <p:sldId id="275" r:id="rId12"/>
     <p:sldId id="291" r:id="rId13"/>
@@ -219,7 +219,7 @@
           <a:p>
             <a:fld id="{720C9186-47A3-C54A-A8AF-47B660C0099D}" type="datetimeFigureOut">
               <a:rPr lang="en-US" smtClean="0"/>
-              <a:t>6/18/20</a:t>
+              <a:t>7/7/20</a:t>
             </a:fld>
             <a:endParaRPr lang="en-US"/>
           </a:p>
@@ -552,7 +552,7 @@
           <a:p>
             <a:fld id="{7A1290A3-92E3-6F43-88C0-EE439678F7B9}" type="slidenum">
               <a:rPr lang="en-US" smtClean="0"/>
-              <a:t>2</a:t>
+              <a:t>3</a:t>
             </a:fld>
             <a:endParaRPr lang="en-US"/>
           </a:p>
@@ -720,7 +720,7 @@
           <a:p>
             <a:fld id="{4AAD347D-5ACD-4C99-B74B-A9C85AD731AF}" type="datetimeFigureOut">
               <a:rPr lang="en-US" smtClean="0"/>
-              <a:t>6/18/20</a:t>
+              <a:t>7/7/20</a:t>
             </a:fld>
             <a:endParaRPr lang="en-US" dirty="0"/>
           </a:p>
@@ -920,7 +920,7 @@
           <a:p>
             <a:fld id="{4AAD347D-5ACD-4C99-B74B-A9C85AD731AF}" type="datetimeFigureOut">
               <a:rPr lang="en-US" smtClean="0"/>
-              <a:t>6/18/20</a:t>
+              <a:t>7/7/20</a:t>
             </a:fld>
             <a:endParaRPr lang="en-US" dirty="0"/>
           </a:p>
@@ -1131,7 +1131,7 @@
           <a:p>
             <a:fld id="{4AAD347D-5ACD-4C99-B74B-A9C85AD731AF}" type="datetimeFigureOut">
               <a:rPr lang="en-US" smtClean="0"/>
-              <a:t>6/18/20</a:t>
+              <a:t>7/7/20</a:t>
             </a:fld>
             <a:endParaRPr lang="en-US" dirty="0"/>
           </a:p>
@@ -1332,7 +1332,7 @@
           <a:p>
             <a:fld id="{4AAD347D-5ACD-4C99-B74B-A9C85AD731AF}" type="datetimeFigureOut">
               <a:rPr lang="en-US" smtClean="0"/>
-              <a:t>6/18/20</a:t>
+              <a:t>7/7/20</a:t>
             </a:fld>
             <a:endParaRPr lang="en-US" dirty="0"/>
           </a:p>
@@ -1609,7 +1609,7 @@
           <a:p>
             <a:fld id="{9796027F-7875-4030-9381-8BD8C4F21935}" type="datetimeFigureOut">
               <a:rPr lang="en-US" smtClean="0"/>
-              <a:t>6/18/20</a:t>
+              <a:t>7/7/20</a:t>
             </a:fld>
             <a:endParaRPr lang="en-US" dirty="0"/>
           </a:p>
@@ -1877,7 +1877,7 @@
           <a:p>
             <a:fld id="{4AAD347D-5ACD-4C99-B74B-A9C85AD731AF}" type="datetimeFigureOut">
               <a:rPr lang="en-US" smtClean="0"/>
-              <a:t>6/18/20</a:t>
+              <a:t>7/7/20</a:t>
             </a:fld>
             <a:endParaRPr lang="en-US" dirty="0"/>
           </a:p>
@@ -2298,7 +2298,7 @@
           <a:p>
             <a:fld id="{4AAD347D-5ACD-4C99-B74B-A9C85AD731AF}" type="datetimeFigureOut">
               <a:rPr lang="en-US" smtClean="0"/>
-              <a:t>6/18/20</a:t>
+              <a:t>7/7/20</a:t>
             </a:fld>
             <a:endParaRPr lang="en-US" dirty="0"/>
           </a:p>
@@ -2441,7 +2441,7 @@
           <a:p>
             <a:fld id="{4509A250-FF31-4206-8172-F9D3106AACB1}" type="datetimeFigureOut">
               <a:rPr lang="en-US" smtClean="0"/>
-              <a:t>6/18/20</a:t>
+              <a:t>7/7/20</a:t>
             </a:fld>
             <a:endParaRPr lang="en-US" dirty="0"/>
           </a:p>
@@ -2554,7 +2554,7 @@
           <a:p>
             <a:fld id="{4509A250-FF31-4206-8172-F9D3106AACB1}" type="datetimeFigureOut">
               <a:rPr lang="en-US" smtClean="0"/>
-              <a:t>6/18/20</a:t>
+              <a:t>7/7/20</a:t>
             </a:fld>
             <a:endParaRPr lang="en-US" dirty="0"/>
           </a:p>
@@ -2867,7 +2867,7 @@
           <a:p>
             <a:fld id="{4AAD347D-5ACD-4C99-B74B-A9C85AD731AF}" type="datetimeFigureOut">
               <a:rPr lang="en-US" smtClean="0"/>
-              <a:t>6/18/20</a:t>
+              <a:t>7/7/20</a:t>
             </a:fld>
             <a:endParaRPr lang="en-US" dirty="0"/>
           </a:p>
@@ -3162,7 +3162,7 @@
           <a:p>
             <a:fld id="{4509A250-FF31-4206-8172-F9D3106AACB1}" type="datetimeFigureOut">
               <a:rPr lang="en-US" smtClean="0"/>
-              <a:t>6/18/20</a:t>
+              <a:t>7/7/20</a:t>
             </a:fld>
             <a:endParaRPr lang="en-US" dirty="0"/>
           </a:p>
@@ -3405,7 +3405,7 @@
           <a:p>
             <a:fld id="{4AAD347D-5ACD-4C99-B74B-A9C85AD731AF}" type="datetimeFigureOut">
               <a:rPr lang="en-US" smtClean="0"/>
-              <a:t>6/18/20</a:t>
+              <a:t>7/7/20</a:t>
             </a:fld>
             <a:endParaRPr lang="en-US" dirty="0"/>
           </a:p>
@@ -3829,7 +3829,7 @@
     <p:bg>
       <p:bgPr>
         <a:solidFill>
-          <a:schemeClr val="bg1"/>
+          <a:schemeClr val="tx1"/>
         </a:solidFill>
         <a:effectLst/>
       </p:bgPr>
@@ -3853,7 +3853,7 @@
           <p:cNvPr id="2" name="Title 1">
             <a:extLst>
               <a:ext uri="{FF2B5EF4-FFF2-40B4-BE49-F238E27FC236}">
-                <a16:creationId xmlns:a16="http://schemas.microsoft.com/office/drawing/2014/main" id="{9E95490D-6DAA-284D-B023-120031A28F47}"/>
+                <a16:creationId xmlns:a16="http://schemas.microsoft.com/office/drawing/2014/main" id="{43B35290-B2B6-324B-9349-4E6692E228FE}"/>
               </a:ext>
             </a:extLst>
           </p:cNvPr>
@@ -3861,15 +3861,10 @@
             <a:spLocks noGrp="1"/>
           </p:cNvSpPr>
           <p:nvPr>
-            <p:ph type="title"/>
+            <p:ph type="ctrTitle"/>
           </p:nvPr>
         </p:nvSpPr>
-        <p:spPr>
-          <a:xfrm>
-            <a:off x="1175512" y="418357"/>
-            <a:ext cx="9792208" cy="1527078"/>
-          </a:xfrm>
-        </p:spPr>
+        <p:spPr/>
         <p:txBody>
           <a:bodyPr>
             <a:normAutofit/>
@@ -3877,778 +3872,112 @@
           <a:lstStyle/>
           <a:p>
             <a:r>
-              <a:rPr lang="en-US" dirty="0">
-                <a:solidFill>
-                  <a:schemeClr val="tx2"/>
-                </a:solidFill>
-              </a:rPr>
-              <a:t>Conditional statements</a:t>
+              <a:rPr lang="en-US" sz="5400" cap="none" dirty="0">
+                <a:solidFill>
+                  <a:schemeClr val="bg2">
+                    <a:lumMod val="75000"/>
+                  </a:schemeClr>
+                </a:solidFill>
+              </a:rPr>
+              <a:t>Introduction to programming  (Python)</a:t>
             </a:r>
           </a:p>
         </p:txBody>
       </p:sp>
       <p:sp>
         <p:nvSpPr>
-          <p:cNvPr id="4" name="Rounded Rectangle 3">
+          <p:cNvPr id="3" name="Subtitle 2">
             <a:extLst>
               <a:ext uri="{FF2B5EF4-FFF2-40B4-BE49-F238E27FC236}">
-                <a16:creationId xmlns:a16="http://schemas.microsoft.com/office/drawing/2014/main" id="{A9194EA6-4EE4-E042-A4DA-4879C165CB4D}"/>
+                <a16:creationId xmlns:a16="http://schemas.microsoft.com/office/drawing/2014/main" id="{E992A13E-D2BD-D347-B675-8C3054F4BE1E}"/>
               </a:ext>
             </a:extLst>
           </p:cNvPr>
-          <p:cNvSpPr/>
-          <p:nvPr/>
+          <p:cNvSpPr>
+            <a:spLocks noGrp="1"/>
+          </p:cNvSpPr>
+          <p:nvPr>
+            <p:ph type="subTitle" idx="1"/>
+          </p:nvPr>
         </p:nvSpPr>
-        <p:spPr>
-          <a:xfrm>
-            <a:off x="6096000" y="2552369"/>
-            <a:ext cx="4871720" cy="3435499"/>
-          </a:xfrm>
-          <a:prstGeom prst="roundRect">
-            <a:avLst/>
-          </a:prstGeom>
-        </p:spPr>
-        <p:style>
-          <a:lnRef idx="2">
-            <a:schemeClr val="accent1">
-              <a:shade val="50000"/>
-            </a:schemeClr>
-          </a:lnRef>
-          <a:fillRef idx="1">
-            <a:schemeClr val="accent1"/>
-          </a:fillRef>
-          <a:effectRef idx="0">
-            <a:schemeClr val="accent1"/>
-          </a:effectRef>
-          <a:fontRef idx="minor">
-            <a:schemeClr val="lt1"/>
-          </a:fontRef>
-        </p:style>
+        <p:spPr/>
         <p:txBody>
-          <a:bodyPr rtlCol="0" anchor="ctr"/>
-          <a:lstStyle/>
-          <a:p>
-            <a:pPr algn="ctr"/>
-            <a:endParaRPr lang="en-US" dirty="0"/>
-          </a:p>
-        </p:txBody>
-      </p:sp>
-      <p:sp>
-        <p:nvSpPr>
-          <p:cNvPr id="5" name="TextBox 4">
-            <a:extLst>
-              <a:ext uri="{FF2B5EF4-FFF2-40B4-BE49-F238E27FC236}">
-                <a16:creationId xmlns:a16="http://schemas.microsoft.com/office/drawing/2014/main" id="{3A491FEC-EAA1-334F-9C2E-4788D8E7B30E}"/>
-              </a:ext>
-            </a:extLst>
-          </p:cNvPr>
-          <p:cNvSpPr txBox="1"/>
-          <p:nvPr/>
-        </p:nvSpPr>
-        <p:spPr>
-          <a:xfrm>
-            <a:off x="6756649" y="2623875"/>
-            <a:ext cx="2893741" cy="646331"/>
-          </a:xfrm>
-          <a:prstGeom prst="rect">
-            <a:avLst/>
-          </a:prstGeom>
-          <a:noFill/>
-        </p:spPr>
-        <p:txBody>
-          <a:bodyPr wrap="none" rtlCol="0">
-            <a:spAutoFit/>
+          <a:bodyPr anchor="ctr">
+            <a:normAutofit/>
           </a:bodyPr>
           <a:lstStyle/>
           <a:p>
-            <a:r>
-              <a:rPr lang="en-US" dirty="0"/>
-              <a:t>Universe: Set of all states</a:t>
-            </a:r>
-          </a:p>
-          <a:p>
-            <a:endParaRPr lang="en-US" dirty="0"/>
-          </a:p>
-        </p:txBody>
-      </p:sp>
-      <p:sp>
-        <p:nvSpPr>
-          <p:cNvPr id="6" name="Rounded Rectangle 5">
-            <a:extLst>
-              <a:ext uri="{FF2B5EF4-FFF2-40B4-BE49-F238E27FC236}">
-                <a16:creationId xmlns:a16="http://schemas.microsoft.com/office/drawing/2014/main" id="{2A5B29C7-77A5-BC42-B34C-29628CAC8B55}"/>
-              </a:ext>
-            </a:extLst>
-          </p:cNvPr>
-          <p:cNvSpPr/>
-          <p:nvPr/>
-        </p:nvSpPr>
-        <p:spPr>
-          <a:xfrm>
-            <a:off x="6376947" y="3183872"/>
-            <a:ext cx="1097280" cy="993913"/>
-          </a:xfrm>
-          <a:prstGeom prst="roundRect">
-            <a:avLst/>
-          </a:prstGeom>
-          <a:solidFill>
-            <a:schemeClr val="bg2">
-              <a:lumMod val="75000"/>
-            </a:schemeClr>
-          </a:solidFill>
-        </p:spPr>
-        <p:style>
-          <a:lnRef idx="2">
-            <a:schemeClr val="accent1">
-              <a:shade val="50000"/>
-            </a:schemeClr>
-          </a:lnRef>
-          <a:fillRef idx="1">
-            <a:schemeClr val="accent1"/>
-          </a:fillRef>
-          <a:effectRef idx="0">
-            <a:schemeClr val="accent1"/>
-          </a:effectRef>
-          <a:fontRef idx="minor">
-            <a:schemeClr val="lt1"/>
-          </a:fontRef>
-        </p:style>
-        <p:txBody>
-          <a:bodyPr rtlCol="0" anchor="ctr"/>
-          <a:lstStyle/>
-          <a:p>
-            <a:pPr algn="ctr"/>
-            <a:endParaRPr lang="en-US"/>
-          </a:p>
-        </p:txBody>
-      </p:sp>
-      <p:sp>
-        <p:nvSpPr>
-          <p:cNvPr id="9" name="TextBox 8">
-            <a:extLst>
-              <a:ext uri="{FF2B5EF4-FFF2-40B4-BE49-F238E27FC236}">
-                <a16:creationId xmlns:a16="http://schemas.microsoft.com/office/drawing/2014/main" id="{B6E6A084-9FB8-2C4A-AB94-5662E5F5645D}"/>
-              </a:ext>
-            </a:extLst>
-          </p:cNvPr>
-          <p:cNvSpPr txBox="1"/>
-          <p:nvPr/>
-        </p:nvSpPr>
-        <p:spPr>
-          <a:xfrm>
-            <a:off x="6324849" y="3442361"/>
-            <a:ext cx="1204177" cy="646331"/>
-          </a:xfrm>
-          <a:prstGeom prst="rect">
-            <a:avLst/>
-          </a:prstGeom>
-          <a:noFill/>
-        </p:spPr>
-        <p:txBody>
-          <a:bodyPr wrap="none" rtlCol="0">
-            <a:spAutoFit/>
-          </a:bodyPr>
-          <a:lstStyle/>
-          <a:p>
-            <a:pPr algn="ctr"/>
-            <a:r>
-              <a:rPr lang="en-US" sz="1200" dirty="0">
-                <a:latin typeface="Consolas" panose="020B0609020204030204" pitchFamily="49" charset="0"/>
-                <a:cs typeface="Consolas" panose="020B0609020204030204" pitchFamily="49" charset="0"/>
-              </a:rPr>
-              <a:t>condition_1 </a:t>
-            </a:r>
-          </a:p>
-          <a:p>
-            <a:pPr algn="ctr"/>
-            <a:r>
-              <a:rPr lang="en-US" sz="1200" dirty="0">
-                <a:latin typeface="Consolas" panose="020B0609020204030204" pitchFamily="49" charset="0"/>
-                <a:cs typeface="Consolas" panose="020B0609020204030204" pitchFamily="49" charset="0"/>
-              </a:rPr>
-              <a:t>== </a:t>
-            </a:r>
-          </a:p>
-          <a:p>
-            <a:pPr algn="ctr"/>
-            <a:r>
-              <a:rPr lang="en-US" sz="1200" dirty="0">
-                <a:latin typeface="Consolas" panose="020B0609020204030204" pitchFamily="49" charset="0"/>
-                <a:cs typeface="Consolas" panose="020B0609020204030204" pitchFamily="49" charset="0"/>
-              </a:rPr>
-              <a:t>True</a:t>
-            </a:r>
-          </a:p>
-        </p:txBody>
-      </p:sp>
-      <p:sp>
-        <p:nvSpPr>
-          <p:cNvPr id="11" name="Rounded Rectangle 10">
-            <a:extLst>
-              <a:ext uri="{FF2B5EF4-FFF2-40B4-BE49-F238E27FC236}">
-                <a16:creationId xmlns:a16="http://schemas.microsoft.com/office/drawing/2014/main" id="{FB7B1BEE-B809-5148-8457-404D4BAB32CA}"/>
-              </a:ext>
-            </a:extLst>
-          </p:cNvPr>
-          <p:cNvSpPr/>
-          <p:nvPr/>
-        </p:nvSpPr>
-        <p:spPr>
-          <a:xfrm>
-            <a:off x="9728889" y="4509834"/>
-            <a:ext cx="1097280" cy="993913"/>
-          </a:xfrm>
-          <a:prstGeom prst="roundRect">
-            <a:avLst/>
-          </a:prstGeom>
-          <a:solidFill>
-            <a:srgbClr val="92D050"/>
-          </a:solidFill>
-        </p:spPr>
-        <p:style>
-          <a:lnRef idx="2">
-            <a:schemeClr val="accent1">
-              <a:shade val="50000"/>
-            </a:schemeClr>
-          </a:lnRef>
-          <a:fillRef idx="1">
-            <a:schemeClr val="accent1"/>
-          </a:fillRef>
-          <a:effectRef idx="0">
-            <a:schemeClr val="accent1"/>
-          </a:effectRef>
-          <a:fontRef idx="minor">
-            <a:schemeClr val="lt1"/>
-          </a:fontRef>
-        </p:style>
-        <p:txBody>
-          <a:bodyPr rtlCol="0" anchor="ctr"/>
-          <a:lstStyle/>
-          <a:p>
-            <a:pPr algn="ctr"/>
-            <a:endParaRPr lang="en-US"/>
-          </a:p>
-        </p:txBody>
-      </p:sp>
-      <p:sp>
-        <p:nvSpPr>
-          <p:cNvPr id="12" name="TextBox 11">
-            <a:extLst>
-              <a:ext uri="{FF2B5EF4-FFF2-40B4-BE49-F238E27FC236}">
-                <a16:creationId xmlns:a16="http://schemas.microsoft.com/office/drawing/2014/main" id="{D3205C27-98C9-4940-9B52-6E97B1B9E07B}"/>
-              </a:ext>
-            </a:extLst>
-          </p:cNvPr>
-          <p:cNvSpPr txBox="1"/>
-          <p:nvPr/>
-        </p:nvSpPr>
-        <p:spPr>
-          <a:xfrm>
-            <a:off x="9676791" y="4683624"/>
-            <a:ext cx="1204177" cy="646331"/>
-          </a:xfrm>
-          <a:prstGeom prst="rect">
-            <a:avLst/>
-          </a:prstGeom>
-          <a:noFill/>
-        </p:spPr>
-        <p:txBody>
-          <a:bodyPr wrap="none" rtlCol="0">
-            <a:spAutoFit/>
-          </a:bodyPr>
-          <a:lstStyle/>
-          <a:p>
-            <a:pPr algn="ctr"/>
-            <a:r>
-              <a:rPr lang="en-US" sz="1200" dirty="0">
-                <a:latin typeface="Consolas" panose="020B0609020204030204" pitchFamily="49" charset="0"/>
-                <a:cs typeface="Consolas" panose="020B0609020204030204" pitchFamily="49" charset="0"/>
-              </a:rPr>
-              <a:t>condition_2 </a:t>
-            </a:r>
-          </a:p>
-          <a:p>
-            <a:pPr algn="ctr"/>
-            <a:r>
-              <a:rPr lang="en-US" sz="1200" dirty="0">
-                <a:latin typeface="Consolas" panose="020B0609020204030204" pitchFamily="49" charset="0"/>
-                <a:cs typeface="Consolas" panose="020B0609020204030204" pitchFamily="49" charset="0"/>
-              </a:rPr>
-              <a:t>== </a:t>
-            </a:r>
-          </a:p>
-          <a:p>
-            <a:pPr algn="ctr"/>
-            <a:r>
-              <a:rPr lang="en-US" sz="1200" dirty="0">
-                <a:latin typeface="Consolas" panose="020B0609020204030204" pitchFamily="49" charset="0"/>
-                <a:cs typeface="Consolas" panose="020B0609020204030204" pitchFamily="49" charset="0"/>
-              </a:rPr>
-              <a:t>True</a:t>
-            </a:r>
-          </a:p>
-        </p:txBody>
-      </p:sp>
-      <p:sp>
-        <p:nvSpPr>
-          <p:cNvPr id="13" name="Rounded Rectangle 12">
-            <a:extLst>
-              <a:ext uri="{FF2B5EF4-FFF2-40B4-BE49-F238E27FC236}">
-                <a16:creationId xmlns:a16="http://schemas.microsoft.com/office/drawing/2014/main" id="{87E5211E-CA6E-CE49-8B6F-3A10D95C1C2A}"/>
-              </a:ext>
-            </a:extLst>
-          </p:cNvPr>
-          <p:cNvSpPr/>
-          <p:nvPr/>
-        </p:nvSpPr>
-        <p:spPr>
-          <a:xfrm>
-            <a:off x="7833361" y="4807653"/>
-            <a:ext cx="1097280" cy="993913"/>
-          </a:xfrm>
-          <a:prstGeom prst="roundRect">
-            <a:avLst/>
-          </a:prstGeom>
-          <a:solidFill>
-            <a:srgbClr val="FFFF00"/>
-          </a:solidFill>
-        </p:spPr>
-        <p:style>
-          <a:lnRef idx="2">
-            <a:schemeClr val="accent1">
-              <a:shade val="50000"/>
-            </a:schemeClr>
-          </a:lnRef>
-          <a:fillRef idx="1">
-            <a:schemeClr val="accent1"/>
-          </a:fillRef>
-          <a:effectRef idx="0">
-            <a:schemeClr val="accent1"/>
-          </a:effectRef>
-          <a:fontRef idx="minor">
-            <a:schemeClr val="lt1"/>
-          </a:fontRef>
-        </p:style>
-        <p:txBody>
-          <a:bodyPr rtlCol="0" anchor="ctr"/>
-          <a:lstStyle/>
-          <a:p>
-            <a:pPr algn="ctr"/>
-            <a:endParaRPr lang="en-US"/>
-          </a:p>
-        </p:txBody>
-      </p:sp>
-      <p:sp>
-        <p:nvSpPr>
-          <p:cNvPr id="14" name="TextBox 13">
-            <a:extLst>
-              <a:ext uri="{FF2B5EF4-FFF2-40B4-BE49-F238E27FC236}">
-                <a16:creationId xmlns:a16="http://schemas.microsoft.com/office/drawing/2014/main" id="{ECD3F22E-5A64-4B46-8EBD-92A00F4262F6}"/>
-              </a:ext>
-            </a:extLst>
-          </p:cNvPr>
-          <p:cNvSpPr txBox="1"/>
-          <p:nvPr/>
-        </p:nvSpPr>
-        <p:spPr>
-          <a:xfrm>
-            <a:off x="7781263" y="5066142"/>
-            <a:ext cx="1204177" cy="646331"/>
-          </a:xfrm>
-          <a:prstGeom prst="rect">
-            <a:avLst/>
-          </a:prstGeom>
-          <a:noFill/>
-        </p:spPr>
-        <p:txBody>
-          <a:bodyPr wrap="none" rtlCol="0">
-            <a:spAutoFit/>
-          </a:bodyPr>
-          <a:lstStyle/>
-          <a:p>
-            <a:pPr algn="ctr"/>
-            <a:r>
-              <a:rPr lang="en-US" sz="1200" dirty="0">
-                <a:latin typeface="Consolas" panose="020B0609020204030204" pitchFamily="49" charset="0"/>
-                <a:cs typeface="Consolas" panose="020B0609020204030204" pitchFamily="49" charset="0"/>
-              </a:rPr>
-              <a:t>condition_3 </a:t>
-            </a:r>
-          </a:p>
-          <a:p>
-            <a:pPr algn="ctr"/>
-            <a:r>
-              <a:rPr lang="en-US" sz="1200" dirty="0">
-                <a:latin typeface="Consolas" panose="020B0609020204030204" pitchFamily="49" charset="0"/>
-                <a:cs typeface="Consolas" panose="020B0609020204030204" pitchFamily="49" charset="0"/>
-              </a:rPr>
-              <a:t>== </a:t>
-            </a:r>
-          </a:p>
-          <a:p>
-            <a:pPr algn="ctr"/>
-            <a:r>
-              <a:rPr lang="en-US" sz="1200" dirty="0">
-                <a:latin typeface="Consolas" panose="020B0609020204030204" pitchFamily="49" charset="0"/>
-                <a:cs typeface="Consolas" panose="020B0609020204030204" pitchFamily="49" charset="0"/>
-              </a:rPr>
-              <a:t>True</a:t>
-            </a:r>
-          </a:p>
-        </p:txBody>
-      </p:sp>
-      <p:sp>
-        <p:nvSpPr>
-          <p:cNvPr id="7" name="TextBox 6">
-            <a:extLst>
-              <a:ext uri="{FF2B5EF4-FFF2-40B4-BE49-F238E27FC236}">
-                <a16:creationId xmlns:a16="http://schemas.microsoft.com/office/drawing/2014/main" id="{9F7C2D59-A944-1348-A50D-E4B1D590106B}"/>
-              </a:ext>
-            </a:extLst>
-          </p:cNvPr>
-          <p:cNvSpPr txBox="1"/>
-          <p:nvPr/>
-        </p:nvSpPr>
-        <p:spPr>
-          <a:xfrm>
-            <a:off x="7648706" y="3063671"/>
-            <a:ext cx="3350597" cy="1200329"/>
-          </a:xfrm>
-          <a:prstGeom prst="rect">
-            <a:avLst/>
-          </a:prstGeom>
-          <a:noFill/>
-        </p:spPr>
-        <p:txBody>
-          <a:bodyPr wrap="none" rtlCol="0">
-            <a:spAutoFit/>
-          </a:bodyPr>
-          <a:lstStyle/>
-          <a:p>
-            <a:r>
-              <a:rPr lang="en-US" dirty="0"/>
-              <a:t>Here, </a:t>
-            </a:r>
-          </a:p>
-          <a:p>
-            <a:r>
-              <a:rPr lang="en-US" dirty="0">
-                <a:latin typeface="Consolas" panose="020B0609020204030204" pitchFamily="49" charset="0"/>
-                <a:cs typeface="Consolas" panose="020B0609020204030204" pitchFamily="49" charset="0"/>
-              </a:rPr>
-              <a:t>condition_1 == False </a:t>
-            </a:r>
-          </a:p>
-          <a:p>
-            <a:r>
-              <a:rPr lang="en-US" dirty="0">
-                <a:latin typeface="Consolas" panose="020B0609020204030204" pitchFamily="49" charset="0"/>
-                <a:cs typeface="Consolas" panose="020B0609020204030204" pitchFamily="49" charset="0"/>
-              </a:rPr>
-              <a:t>and condition_2 == False </a:t>
-            </a:r>
-          </a:p>
-          <a:p>
-            <a:r>
-              <a:rPr lang="en-US" dirty="0">
-                <a:latin typeface="Consolas" panose="020B0609020204030204" pitchFamily="49" charset="0"/>
-                <a:cs typeface="Consolas" panose="020B0609020204030204" pitchFamily="49" charset="0"/>
-              </a:rPr>
-              <a:t>and condition_3 == False</a:t>
-            </a:r>
-          </a:p>
-        </p:txBody>
-      </p:sp>
-      <p:sp>
-        <p:nvSpPr>
-          <p:cNvPr id="15" name="TextBox 14">
-            <a:extLst>
-              <a:ext uri="{FF2B5EF4-FFF2-40B4-BE49-F238E27FC236}">
-                <a16:creationId xmlns:a16="http://schemas.microsoft.com/office/drawing/2014/main" id="{7CE6CE9C-F282-0046-B314-689EFC9DE483}"/>
-              </a:ext>
-            </a:extLst>
-          </p:cNvPr>
-          <p:cNvSpPr txBox="1"/>
-          <p:nvPr/>
-        </p:nvSpPr>
-        <p:spPr>
-          <a:xfrm>
-            <a:off x="1310343" y="2034528"/>
-            <a:ext cx="3749274" cy="4278094"/>
-          </a:xfrm>
-          <a:prstGeom prst="rect">
-            <a:avLst/>
-          </a:prstGeom>
-          <a:solidFill>
-            <a:schemeClr val="tx1">
-              <a:lumMod val="85000"/>
-              <a:lumOff val="15000"/>
-            </a:schemeClr>
-          </a:solidFill>
-        </p:spPr>
-        <p:txBody>
-          <a:bodyPr wrap="square" rtlCol="0">
-            <a:spAutoFit/>
-          </a:bodyPr>
-          <a:lstStyle/>
-          <a:p>
-            <a:r>
-              <a:rPr lang="en-US" sz="1600" b="1" dirty="0">
+            <a:pPr>
+              <a:spcAft>
+                <a:spcPts val="600"/>
+              </a:spcAft>
+            </a:pPr>
+            <a:r>
+              <a:rPr lang="en-US" sz="2000" cap="none" dirty="0">
                 <a:solidFill>
                   <a:schemeClr val="bg2">
                     <a:lumMod val="75000"/>
                   </a:schemeClr>
                 </a:solidFill>
-                <a:latin typeface="Consolas" panose="020B0609020204030204" pitchFamily="49" charset="0"/>
-                <a:cs typeface="Consolas" panose="020B0609020204030204" pitchFamily="49" charset="0"/>
-              </a:rPr>
-              <a:t>If</a:t>
-            </a:r>
-            <a:r>
-              <a:rPr lang="en-US" sz="1600" dirty="0">
+              </a:rPr>
+              <a:t>Session</a:t>
+            </a:r>
+            <a:r>
+              <a:rPr lang="en-US" sz="2000" dirty="0">
                 <a:solidFill>
                   <a:schemeClr val="bg2">
                     <a:lumMod val="75000"/>
                   </a:schemeClr>
                 </a:solidFill>
-                <a:latin typeface="Consolas" panose="020B0609020204030204" pitchFamily="49" charset="0"/>
-                <a:cs typeface="Consolas" panose="020B0609020204030204" pitchFamily="49" charset="0"/>
-              </a:rPr>
-              <a:t> condition_1 == True:</a:t>
-            </a:r>
-          </a:p>
-          <a:p>
-            <a:pPr lvl="1"/>
-            <a:r>
-              <a:rPr lang="en-US" sz="1600" dirty="0">
+              </a:rPr>
+              <a:t> #4</a:t>
+            </a:r>
+          </a:p>
+          <a:p>
+            <a:pPr>
+              <a:spcAft>
+                <a:spcPts val="600"/>
+              </a:spcAft>
+            </a:pPr>
+            <a:r>
+              <a:rPr lang="en-US" sz="2000" dirty="0">
                 <a:solidFill>
                   <a:schemeClr val="bg2">
                     <a:lumMod val="75000"/>
                   </a:schemeClr>
                 </a:solidFill>
-                <a:latin typeface="Consolas" panose="020B0609020204030204" pitchFamily="49" charset="0"/>
-                <a:cs typeface="Consolas" panose="020B0609020204030204" pitchFamily="49" charset="0"/>
-              </a:rPr>
-              <a:t># do thing 1</a:t>
-            </a:r>
-          </a:p>
-          <a:p>
-            <a:pPr lvl="1"/>
-            <a:r>
-              <a:rPr lang="en-US" sz="1600" dirty="0">
+              </a:rPr>
+              <a:t>Conditionals</a:t>
+            </a:r>
+            <a:r>
+              <a:rPr lang="en-US" sz="2000">
                 <a:solidFill>
                   <a:schemeClr val="bg2">
                     <a:lumMod val="75000"/>
                   </a:schemeClr>
                 </a:solidFill>
-                <a:latin typeface="Consolas" panose="020B0609020204030204" pitchFamily="49" charset="0"/>
-                <a:cs typeface="Consolas" panose="020B0609020204030204" pitchFamily="49" charset="0"/>
-              </a:rPr>
-              <a:t># do thing 2</a:t>
-            </a:r>
-          </a:p>
-          <a:p>
-            <a:pPr lvl="1"/>
-            <a:r>
-              <a:rPr lang="en-US" sz="1600" i="1" dirty="0">
-                <a:solidFill>
-                  <a:schemeClr val="bg2">
-                    <a:lumMod val="75000"/>
-                  </a:schemeClr>
-                </a:solidFill>
-                <a:latin typeface="Consolas" panose="020B0609020204030204" pitchFamily="49" charset="0"/>
-                <a:cs typeface="Consolas" panose="020B0609020204030204" pitchFamily="49" charset="0"/>
-              </a:rPr>
-              <a:t># notice the indentation</a:t>
-            </a:r>
-          </a:p>
-          <a:p>
-            <a:r>
-              <a:rPr lang="en-US" sz="1600" b="1" dirty="0">
-                <a:solidFill>
-                  <a:srgbClr val="92D050"/>
-                </a:solidFill>
-                <a:latin typeface="Consolas" panose="020B0609020204030204" pitchFamily="49" charset="0"/>
-                <a:cs typeface="Consolas" panose="020B0609020204030204" pitchFamily="49" charset="0"/>
-              </a:rPr>
-              <a:t>elif</a:t>
-            </a:r>
-            <a:r>
-              <a:rPr lang="en-US" sz="1600" dirty="0">
-                <a:solidFill>
-                  <a:srgbClr val="92D050"/>
-                </a:solidFill>
-                <a:latin typeface="Consolas" panose="020B0609020204030204" pitchFamily="49" charset="0"/>
-                <a:cs typeface="Consolas" panose="020B0609020204030204" pitchFamily="49" charset="0"/>
-              </a:rPr>
-              <a:t> condition_2 == True:</a:t>
-            </a:r>
-          </a:p>
-          <a:p>
-            <a:pPr lvl="1"/>
-            <a:r>
-              <a:rPr lang="en-US" sz="1600" dirty="0">
-                <a:solidFill>
-                  <a:srgbClr val="92D050"/>
-                </a:solidFill>
-                <a:latin typeface="Consolas" panose="020B0609020204030204" pitchFamily="49" charset="0"/>
-                <a:cs typeface="Consolas" panose="020B0609020204030204" pitchFamily="49" charset="0"/>
-              </a:rPr>
-              <a:t># do thing 3</a:t>
-            </a:r>
-          </a:p>
-          <a:p>
-            <a:pPr lvl="1"/>
-            <a:r>
-              <a:rPr lang="en-US" sz="1600" dirty="0">
-                <a:solidFill>
-                  <a:srgbClr val="92D050"/>
-                </a:solidFill>
-                <a:latin typeface="Consolas" panose="020B0609020204030204" pitchFamily="49" charset="0"/>
-                <a:cs typeface="Consolas" panose="020B0609020204030204" pitchFamily="49" charset="0"/>
-              </a:rPr>
-              <a:t># do thing 4</a:t>
-            </a:r>
-          </a:p>
-          <a:p>
-            <a:pPr lvl="1"/>
-            <a:r>
-              <a:rPr lang="en-US" sz="1600" i="1" dirty="0">
-                <a:solidFill>
-                  <a:srgbClr val="92D050"/>
-                </a:solidFill>
-                <a:latin typeface="Consolas" panose="020B0609020204030204" pitchFamily="49" charset="0"/>
-                <a:cs typeface="Consolas" panose="020B0609020204030204" pitchFamily="49" charset="0"/>
-              </a:rPr>
-              <a:t># notice the indentation</a:t>
-            </a:r>
-          </a:p>
-          <a:p>
-            <a:r>
-              <a:rPr lang="en-US" sz="1600" b="1" dirty="0">
-                <a:solidFill>
-                  <a:srgbClr val="FFFF00"/>
-                </a:solidFill>
-                <a:latin typeface="Consolas" panose="020B0609020204030204" pitchFamily="49" charset="0"/>
-                <a:cs typeface="Consolas" panose="020B0609020204030204" pitchFamily="49" charset="0"/>
-              </a:rPr>
-              <a:t>elif</a:t>
-            </a:r>
-            <a:r>
-              <a:rPr lang="en-US" sz="1600" dirty="0">
-                <a:solidFill>
-                  <a:srgbClr val="FFFF00"/>
-                </a:solidFill>
-                <a:latin typeface="Consolas" panose="020B0609020204030204" pitchFamily="49" charset="0"/>
-                <a:cs typeface="Consolas" panose="020B0609020204030204" pitchFamily="49" charset="0"/>
-              </a:rPr>
-              <a:t> condition_3 == True:</a:t>
-            </a:r>
-          </a:p>
-          <a:p>
-            <a:pPr lvl="1"/>
-            <a:r>
-              <a:rPr lang="en-US" sz="1600" dirty="0">
-                <a:solidFill>
-                  <a:srgbClr val="FFFF00"/>
-                </a:solidFill>
-                <a:latin typeface="Consolas" panose="020B0609020204030204" pitchFamily="49" charset="0"/>
-                <a:cs typeface="Consolas" panose="020B0609020204030204" pitchFamily="49" charset="0"/>
-              </a:rPr>
-              <a:t># do thing 5</a:t>
-            </a:r>
-          </a:p>
-          <a:p>
-            <a:pPr lvl="1"/>
-            <a:r>
-              <a:rPr lang="en-US" sz="1600" dirty="0">
-                <a:solidFill>
-                  <a:srgbClr val="FFFF00"/>
-                </a:solidFill>
-                <a:latin typeface="Consolas" panose="020B0609020204030204" pitchFamily="49" charset="0"/>
-                <a:cs typeface="Consolas" panose="020B0609020204030204" pitchFamily="49" charset="0"/>
-              </a:rPr>
-              <a:t># do thing 6</a:t>
-            </a:r>
-          </a:p>
-          <a:p>
-            <a:pPr lvl="1"/>
-            <a:r>
-              <a:rPr lang="en-US" sz="1600" i="1" dirty="0">
-                <a:solidFill>
-                  <a:srgbClr val="FFFF00"/>
-                </a:solidFill>
-                <a:latin typeface="Consolas" panose="020B0609020204030204" pitchFamily="49" charset="0"/>
-                <a:cs typeface="Consolas" panose="020B0609020204030204" pitchFamily="49" charset="0"/>
-              </a:rPr>
-              <a:t># notice the indentation</a:t>
-            </a:r>
-          </a:p>
-          <a:p>
-            <a:r>
-              <a:rPr lang="en-US" sz="1600" i="1" dirty="0">
-                <a:solidFill>
-                  <a:schemeClr val="accent1"/>
-                </a:solidFill>
-                <a:latin typeface="Consolas" panose="020B0609020204030204" pitchFamily="49" charset="0"/>
-                <a:cs typeface="Consolas" panose="020B0609020204030204" pitchFamily="49" charset="0"/>
-              </a:rPr>
-              <a:t>else:</a:t>
-            </a:r>
-          </a:p>
-          <a:p>
-            <a:pPr lvl="1"/>
-            <a:r>
-              <a:rPr lang="en-US" sz="1600" dirty="0">
-                <a:solidFill>
-                  <a:schemeClr val="accent1"/>
-                </a:solidFill>
-                <a:latin typeface="Consolas" panose="020B0609020204030204" pitchFamily="49" charset="0"/>
-                <a:cs typeface="Consolas" panose="020B0609020204030204" pitchFamily="49" charset="0"/>
-              </a:rPr>
-              <a:t># do thing 7</a:t>
-            </a:r>
-          </a:p>
-          <a:p>
-            <a:pPr lvl="1"/>
-            <a:r>
-              <a:rPr lang="en-US" sz="1600" dirty="0">
-                <a:solidFill>
-                  <a:schemeClr val="accent1"/>
-                </a:solidFill>
-                <a:latin typeface="Consolas" panose="020B0609020204030204" pitchFamily="49" charset="0"/>
-                <a:cs typeface="Consolas" panose="020B0609020204030204" pitchFamily="49" charset="0"/>
-              </a:rPr>
-              <a:t># do thing 8</a:t>
-            </a:r>
-          </a:p>
-          <a:p>
-            <a:pPr lvl="1"/>
-            <a:r>
-              <a:rPr lang="en-US" sz="1600" i="1" dirty="0">
-                <a:solidFill>
-                  <a:schemeClr val="accent1"/>
-                </a:solidFill>
-                <a:latin typeface="Consolas" panose="020B0609020204030204" pitchFamily="49" charset="0"/>
-                <a:cs typeface="Consolas" panose="020B0609020204030204" pitchFamily="49" charset="0"/>
-              </a:rPr>
-              <a:t># notice the indentation</a:t>
-            </a:r>
-          </a:p>
-          <a:p>
-            <a:endParaRPr lang="en-US" sz="1600" dirty="0"/>
+              </a:rPr>
+              <a:t>, Character, String</a:t>
+            </a:r>
+            <a:endParaRPr lang="en-US" sz="2000" dirty="0">
+              <a:solidFill>
+                <a:schemeClr val="bg2">
+                  <a:lumMod val="75000"/>
+                </a:schemeClr>
+              </a:solidFill>
+            </a:endParaRPr>
           </a:p>
         </p:txBody>
       </p:sp>
     </p:spTree>
     <p:extLst>
       <p:ext uri="{BB962C8B-B14F-4D97-AF65-F5344CB8AC3E}">
-        <p14:creationId xmlns:p14="http://schemas.microsoft.com/office/powerpoint/2010/main" val="2318328884"/>
+        <p14:creationId xmlns:p14="http://schemas.microsoft.com/office/powerpoint/2010/main" val="1904483027"/>
       </p:ext>
     </p:extLst>
   </p:cSld>
   <p:clrMapOvr>
-    <a:masterClrMapping/>
+    <a:overrideClrMapping bg1="dk1" tx1="lt1" bg2="dk2" tx2="lt2" accent1="accent1" accent2="accent2" accent3="accent3" accent4="accent4" accent5="accent5" accent6="accent6" hlink="hlink" folHlink="folHlink"/>
   </p:clrMapOvr>
 </p:sld>
 </file>
@@ -10700,10 +10029,10 @@
       </p:grpSpPr>
       <p:sp>
         <p:nvSpPr>
-          <p:cNvPr id="3" name="Content Placeholder 2">
+          <p:cNvPr id="2" name="Title 1">
             <a:extLst>
               <a:ext uri="{FF2B5EF4-FFF2-40B4-BE49-F238E27FC236}">
-                <a16:creationId xmlns:a16="http://schemas.microsoft.com/office/drawing/2014/main" id="{E82EBBE1-3A6B-1C40-862C-EED1C505C3ED}"/>
+                <a16:creationId xmlns:a16="http://schemas.microsoft.com/office/drawing/2014/main" id="{9E95490D-6DAA-284D-B023-120031A28F47}"/>
               </a:ext>
             </a:extLst>
           </p:cNvPr>
@@ -10711,48 +10040,570 @@
             <a:spLocks noGrp="1"/>
           </p:cNvSpPr>
           <p:nvPr>
-            <p:ph idx="1"/>
+            <p:ph type="title"/>
           </p:nvPr>
         </p:nvSpPr>
         <p:spPr>
           <a:xfrm>
-            <a:off x="970059" y="834887"/>
-            <a:ext cx="9997661" cy="5130824"/>
+            <a:off x="1175512" y="418357"/>
+            <a:ext cx="9792208" cy="1527078"/>
           </a:xfrm>
         </p:spPr>
         <p:txBody>
           <a:bodyPr>
-            <a:normAutofit fontScale="70000" lnSpcReduction="20000"/>
+            <a:normAutofit/>
           </a:bodyPr>
           <a:lstStyle/>
           <a:p>
             <a:r>
-              <a:rPr lang="en-US" b="1" dirty="0">
+              <a:rPr lang="en-US" dirty="0">
                 <a:solidFill>
                   <a:schemeClr val="tx2"/>
                 </a:solidFill>
-                <a:latin typeface="Consolas" panose="020B0609020204030204" pitchFamily="49" charset="0"/>
-                <a:cs typeface="Consolas" panose="020B0609020204030204" pitchFamily="49" charset="0"/>
-              </a:rPr>
-              <a:t>while</a:t>
-            </a:r>
-            <a:r>
-              <a:rPr lang="en-US" dirty="0">
-                <a:solidFill>
-                  <a:schemeClr val="tx2"/>
-                </a:solidFill>
-                <a:latin typeface="Consolas" panose="020B0609020204030204" pitchFamily="49" charset="0"/>
-                <a:cs typeface="Consolas" panose="020B0609020204030204" pitchFamily="49" charset="0"/>
-              </a:rPr>
-              <a:t> condition:</a:t>
+              </a:rPr>
+              <a:t>Conditional statements</a:t>
+            </a:r>
+          </a:p>
+        </p:txBody>
+      </p:sp>
+      <p:sp>
+        <p:nvSpPr>
+          <p:cNvPr id="4" name="Rounded Rectangle 3">
+            <a:extLst>
+              <a:ext uri="{FF2B5EF4-FFF2-40B4-BE49-F238E27FC236}">
+                <a16:creationId xmlns:a16="http://schemas.microsoft.com/office/drawing/2014/main" id="{A9194EA6-4EE4-E042-A4DA-4879C165CB4D}"/>
+              </a:ext>
+            </a:extLst>
+          </p:cNvPr>
+          <p:cNvSpPr/>
+          <p:nvPr/>
+        </p:nvSpPr>
+        <p:spPr>
+          <a:xfrm>
+            <a:off x="6096000" y="2552369"/>
+            <a:ext cx="4871720" cy="3435499"/>
+          </a:xfrm>
+          <a:prstGeom prst="roundRect">
+            <a:avLst/>
+          </a:prstGeom>
+        </p:spPr>
+        <p:style>
+          <a:lnRef idx="2">
+            <a:schemeClr val="accent1">
+              <a:shade val="50000"/>
+            </a:schemeClr>
+          </a:lnRef>
+          <a:fillRef idx="1">
+            <a:schemeClr val="accent1"/>
+          </a:fillRef>
+          <a:effectRef idx="0">
+            <a:schemeClr val="accent1"/>
+          </a:effectRef>
+          <a:fontRef idx="minor">
+            <a:schemeClr val="lt1"/>
+          </a:fontRef>
+        </p:style>
+        <p:txBody>
+          <a:bodyPr rtlCol="0" anchor="ctr"/>
+          <a:lstStyle/>
+          <a:p>
+            <a:pPr algn="ctr"/>
+            <a:endParaRPr lang="en-US" dirty="0"/>
+          </a:p>
+        </p:txBody>
+      </p:sp>
+      <p:sp>
+        <p:nvSpPr>
+          <p:cNvPr id="5" name="TextBox 4">
+            <a:extLst>
+              <a:ext uri="{FF2B5EF4-FFF2-40B4-BE49-F238E27FC236}">
+                <a16:creationId xmlns:a16="http://schemas.microsoft.com/office/drawing/2014/main" id="{3A491FEC-EAA1-334F-9C2E-4788D8E7B30E}"/>
+              </a:ext>
+            </a:extLst>
+          </p:cNvPr>
+          <p:cNvSpPr txBox="1"/>
+          <p:nvPr/>
+        </p:nvSpPr>
+        <p:spPr>
+          <a:xfrm>
+            <a:off x="6756649" y="2623875"/>
+            <a:ext cx="2893741" cy="646331"/>
+          </a:xfrm>
+          <a:prstGeom prst="rect">
+            <a:avLst/>
+          </a:prstGeom>
+          <a:noFill/>
+        </p:spPr>
+        <p:txBody>
+          <a:bodyPr wrap="none" rtlCol="0">
+            <a:spAutoFit/>
+          </a:bodyPr>
+          <a:lstStyle/>
+          <a:p>
+            <a:r>
+              <a:rPr lang="en-US" dirty="0"/>
+              <a:t>Universe: Set of all states</a:t>
+            </a:r>
+          </a:p>
+          <a:p>
+            <a:endParaRPr lang="en-US" dirty="0"/>
+          </a:p>
+        </p:txBody>
+      </p:sp>
+      <p:sp>
+        <p:nvSpPr>
+          <p:cNvPr id="6" name="Rounded Rectangle 5">
+            <a:extLst>
+              <a:ext uri="{FF2B5EF4-FFF2-40B4-BE49-F238E27FC236}">
+                <a16:creationId xmlns:a16="http://schemas.microsoft.com/office/drawing/2014/main" id="{2A5B29C7-77A5-BC42-B34C-29628CAC8B55}"/>
+              </a:ext>
+            </a:extLst>
+          </p:cNvPr>
+          <p:cNvSpPr/>
+          <p:nvPr/>
+        </p:nvSpPr>
+        <p:spPr>
+          <a:xfrm>
+            <a:off x="6376947" y="3183872"/>
+            <a:ext cx="1097280" cy="993913"/>
+          </a:xfrm>
+          <a:prstGeom prst="roundRect">
+            <a:avLst/>
+          </a:prstGeom>
+          <a:solidFill>
+            <a:schemeClr val="bg2">
+              <a:lumMod val="75000"/>
+            </a:schemeClr>
+          </a:solidFill>
+        </p:spPr>
+        <p:style>
+          <a:lnRef idx="2">
+            <a:schemeClr val="accent1">
+              <a:shade val="50000"/>
+            </a:schemeClr>
+          </a:lnRef>
+          <a:fillRef idx="1">
+            <a:schemeClr val="accent1"/>
+          </a:fillRef>
+          <a:effectRef idx="0">
+            <a:schemeClr val="accent1"/>
+          </a:effectRef>
+          <a:fontRef idx="minor">
+            <a:schemeClr val="lt1"/>
+          </a:fontRef>
+        </p:style>
+        <p:txBody>
+          <a:bodyPr rtlCol="0" anchor="ctr"/>
+          <a:lstStyle/>
+          <a:p>
+            <a:pPr algn="ctr"/>
+            <a:endParaRPr lang="en-US"/>
+          </a:p>
+        </p:txBody>
+      </p:sp>
+      <p:sp>
+        <p:nvSpPr>
+          <p:cNvPr id="9" name="TextBox 8">
+            <a:extLst>
+              <a:ext uri="{FF2B5EF4-FFF2-40B4-BE49-F238E27FC236}">
+                <a16:creationId xmlns:a16="http://schemas.microsoft.com/office/drawing/2014/main" id="{B6E6A084-9FB8-2C4A-AB94-5662E5F5645D}"/>
+              </a:ext>
+            </a:extLst>
+          </p:cNvPr>
+          <p:cNvSpPr txBox="1"/>
+          <p:nvPr/>
+        </p:nvSpPr>
+        <p:spPr>
+          <a:xfrm>
+            <a:off x="6324849" y="3442361"/>
+            <a:ext cx="1204177" cy="646331"/>
+          </a:xfrm>
+          <a:prstGeom prst="rect">
+            <a:avLst/>
+          </a:prstGeom>
+          <a:noFill/>
+        </p:spPr>
+        <p:txBody>
+          <a:bodyPr wrap="none" rtlCol="0">
+            <a:spAutoFit/>
+          </a:bodyPr>
+          <a:lstStyle/>
+          <a:p>
+            <a:pPr algn="ctr"/>
+            <a:r>
+              <a:rPr lang="en-US" sz="1200" dirty="0">
+                <a:latin typeface="Consolas" panose="020B0609020204030204" pitchFamily="49" charset="0"/>
+                <a:cs typeface="Consolas" panose="020B0609020204030204" pitchFamily="49" charset="0"/>
+              </a:rPr>
+              <a:t>condition_1 </a:t>
+            </a:r>
+          </a:p>
+          <a:p>
+            <a:pPr algn="ctr"/>
+            <a:r>
+              <a:rPr lang="en-US" sz="1200" dirty="0">
+                <a:latin typeface="Consolas" panose="020B0609020204030204" pitchFamily="49" charset="0"/>
+                <a:cs typeface="Consolas" panose="020B0609020204030204" pitchFamily="49" charset="0"/>
+              </a:rPr>
+              <a:t>== </a:t>
+            </a:r>
+          </a:p>
+          <a:p>
+            <a:pPr algn="ctr"/>
+            <a:r>
+              <a:rPr lang="en-US" sz="1200" dirty="0">
+                <a:latin typeface="Consolas" panose="020B0609020204030204" pitchFamily="49" charset="0"/>
+                <a:cs typeface="Consolas" panose="020B0609020204030204" pitchFamily="49" charset="0"/>
+              </a:rPr>
+              <a:t>True</a:t>
+            </a:r>
+          </a:p>
+        </p:txBody>
+      </p:sp>
+      <p:sp>
+        <p:nvSpPr>
+          <p:cNvPr id="11" name="Rounded Rectangle 10">
+            <a:extLst>
+              <a:ext uri="{FF2B5EF4-FFF2-40B4-BE49-F238E27FC236}">
+                <a16:creationId xmlns:a16="http://schemas.microsoft.com/office/drawing/2014/main" id="{FB7B1BEE-B809-5148-8457-404D4BAB32CA}"/>
+              </a:ext>
+            </a:extLst>
+          </p:cNvPr>
+          <p:cNvSpPr/>
+          <p:nvPr/>
+        </p:nvSpPr>
+        <p:spPr>
+          <a:xfrm>
+            <a:off x="9728889" y="4509834"/>
+            <a:ext cx="1097280" cy="993913"/>
+          </a:xfrm>
+          <a:prstGeom prst="roundRect">
+            <a:avLst/>
+          </a:prstGeom>
+          <a:solidFill>
+            <a:srgbClr val="92D050"/>
+          </a:solidFill>
+        </p:spPr>
+        <p:style>
+          <a:lnRef idx="2">
+            <a:schemeClr val="accent1">
+              <a:shade val="50000"/>
+            </a:schemeClr>
+          </a:lnRef>
+          <a:fillRef idx="1">
+            <a:schemeClr val="accent1"/>
+          </a:fillRef>
+          <a:effectRef idx="0">
+            <a:schemeClr val="accent1"/>
+          </a:effectRef>
+          <a:fontRef idx="minor">
+            <a:schemeClr val="lt1"/>
+          </a:fontRef>
+        </p:style>
+        <p:txBody>
+          <a:bodyPr rtlCol="0" anchor="ctr"/>
+          <a:lstStyle/>
+          <a:p>
+            <a:pPr algn="ctr"/>
+            <a:endParaRPr lang="en-US"/>
+          </a:p>
+        </p:txBody>
+      </p:sp>
+      <p:sp>
+        <p:nvSpPr>
+          <p:cNvPr id="12" name="TextBox 11">
+            <a:extLst>
+              <a:ext uri="{FF2B5EF4-FFF2-40B4-BE49-F238E27FC236}">
+                <a16:creationId xmlns:a16="http://schemas.microsoft.com/office/drawing/2014/main" id="{D3205C27-98C9-4940-9B52-6E97B1B9E07B}"/>
+              </a:ext>
+            </a:extLst>
+          </p:cNvPr>
+          <p:cNvSpPr txBox="1"/>
+          <p:nvPr/>
+        </p:nvSpPr>
+        <p:spPr>
+          <a:xfrm>
+            <a:off x="9676791" y="4683624"/>
+            <a:ext cx="1204177" cy="646331"/>
+          </a:xfrm>
+          <a:prstGeom prst="rect">
+            <a:avLst/>
+          </a:prstGeom>
+          <a:noFill/>
+        </p:spPr>
+        <p:txBody>
+          <a:bodyPr wrap="none" rtlCol="0">
+            <a:spAutoFit/>
+          </a:bodyPr>
+          <a:lstStyle/>
+          <a:p>
+            <a:pPr algn="ctr"/>
+            <a:r>
+              <a:rPr lang="en-US" sz="1200" dirty="0">
+                <a:latin typeface="Consolas" panose="020B0609020204030204" pitchFamily="49" charset="0"/>
+                <a:cs typeface="Consolas" panose="020B0609020204030204" pitchFamily="49" charset="0"/>
+              </a:rPr>
+              <a:t>condition_2 </a:t>
+            </a:r>
+          </a:p>
+          <a:p>
+            <a:pPr algn="ctr"/>
+            <a:r>
+              <a:rPr lang="en-US" sz="1200" dirty="0">
+                <a:latin typeface="Consolas" panose="020B0609020204030204" pitchFamily="49" charset="0"/>
+                <a:cs typeface="Consolas" panose="020B0609020204030204" pitchFamily="49" charset="0"/>
+              </a:rPr>
+              <a:t>== </a:t>
+            </a:r>
+          </a:p>
+          <a:p>
+            <a:pPr algn="ctr"/>
+            <a:r>
+              <a:rPr lang="en-US" sz="1200" dirty="0">
+                <a:latin typeface="Consolas" panose="020B0609020204030204" pitchFamily="49" charset="0"/>
+                <a:cs typeface="Consolas" panose="020B0609020204030204" pitchFamily="49" charset="0"/>
+              </a:rPr>
+              <a:t>True</a:t>
+            </a:r>
+          </a:p>
+        </p:txBody>
+      </p:sp>
+      <p:sp>
+        <p:nvSpPr>
+          <p:cNvPr id="13" name="Rounded Rectangle 12">
+            <a:extLst>
+              <a:ext uri="{FF2B5EF4-FFF2-40B4-BE49-F238E27FC236}">
+                <a16:creationId xmlns:a16="http://schemas.microsoft.com/office/drawing/2014/main" id="{87E5211E-CA6E-CE49-8B6F-3A10D95C1C2A}"/>
+              </a:ext>
+            </a:extLst>
+          </p:cNvPr>
+          <p:cNvSpPr/>
+          <p:nvPr/>
+        </p:nvSpPr>
+        <p:spPr>
+          <a:xfrm>
+            <a:off x="7833361" y="4807653"/>
+            <a:ext cx="1097280" cy="993913"/>
+          </a:xfrm>
+          <a:prstGeom prst="roundRect">
+            <a:avLst/>
+          </a:prstGeom>
+          <a:solidFill>
+            <a:srgbClr val="FFFF00"/>
+          </a:solidFill>
+        </p:spPr>
+        <p:style>
+          <a:lnRef idx="2">
+            <a:schemeClr val="accent1">
+              <a:shade val="50000"/>
+            </a:schemeClr>
+          </a:lnRef>
+          <a:fillRef idx="1">
+            <a:schemeClr val="accent1"/>
+          </a:fillRef>
+          <a:effectRef idx="0">
+            <a:schemeClr val="accent1"/>
+          </a:effectRef>
+          <a:fontRef idx="minor">
+            <a:schemeClr val="lt1"/>
+          </a:fontRef>
+        </p:style>
+        <p:txBody>
+          <a:bodyPr rtlCol="0" anchor="ctr"/>
+          <a:lstStyle/>
+          <a:p>
+            <a:pPr algn="ctr"/>
+            <a:endParaRPr lang="en-US"/>
+          </a:p>
+        </p:txBody>
+      </p:sp>
+      <p:sp>
+        <p:nvSpPr>
+          <p:cNvPr id="14" name="TextBox 13">
+            <a:extLst>
+              <a:ext uri="{FF2B5EF4-FFF2-40B4-BE49-F238E27FC236}">
+                <a16:creationId xmlns:a16="http://schemas.microsoft.com/office/drawing/2014/main" id="{ECD3F22E-5A64-4B46-8EBD-92A00F4262F6}"/>
+              </a:ext>
+            </a:extLst>
+          </p:cNvPr>
+          <p:cNvSpPr txBox="1"/>
+          <p:nvPr/>
+        </p:nvSpPr>
+        <p:spPr>
+          <a:xfrm>
+            <a:off x="7781263" y="5066142"/>
+            <a:ext cx="1204177" cy="646331"/>
+          </a:xfrm>
+          <a:prstGeom prst="rect">
+            <a:avLst/>
+          </a:prstGeom>
+          <a:noFill/>
+        </p:spPr>
+        <p:txBody>
+          <a:bodyPr wrap="none" rtlCol="0">
+            <a:spAutoFit/>
+          </a:bodyPr>
+          <a:lstStyle/>
+          <a:p>
+            <a:pPr algn="ctr"/>
+            <a:r>
+              <a:rPr lang="en-US" sz="1200" dirty="0">
+                <a:latin typeface="Consolas" panose="020B0609020204030204" pitchFamily="49" charset="0"/>
+                <a:cs typeface="Consolas" panose="020B0609020204030204" pitchFamily="49" charset="0"/>
+              </a:rPr>
+              <a:t>condition_3 </a:t>
+            </a:r>
+          </a:p>
+          <a:p>
+            <a:pPr algn="ctr"/>
+            <a:r>
+              <a:rPr lang="en-US" sz="1200" dirty="0">
+                <a:latin typeface="Consolas" panose="020B0609020204030204" pitchFamily="49" charset="0"/>
+                <a:cs typeface="Consolas" panose="020B0609020204030204" pitchFamily="49" charset="0"/>
+              </a:rPr>
+              <a:t>== </a:t>
+            </a:r>
+          </a:p>
+          <a:p>
+            <a:pPr algn="ctr"/>
+            <a:r>
+              <a:rPr lang="en-US" sz="1200" dirty="0">
+                <a:latin typeface="Consolas" panose="020B0609020204030204" pitchFamily="49" charset="0"/>
+                <a:cs typeface="Consolas" panose="020B0609020204030204" pitchFamily="49" charset="0"/>
+              </a:rPr>
+              <a:t>True</a:t>
+            </a:r>
+          </a:p>
+        </p:txBody>
+      </p:sp>
+      <p:sp>
+        <p:nvSpPr>
+          <p:cNvPr id="7" name="TextBox 6">
+            <a:extLst>
+              <a:ext uri="{FF2B5EF4-FFF2-40B4-BE49-F238E27FC236}">
+                <a16:creationId xmlns:a16="http://schemas.microsoft.com/office/drawing/2014/main" id="{9F7C2D59-A944-1348-A50D-E4B1D590106B}"/>
+              </a:ext>
+            </a:extLst>
+          </p:cNvPr>
+          <p:cNvSpPr txBox="1"/>
+          <p:nvPr/>
+        </p:nvSpPr>
+        <p:spPr>
+          <a:xfrm>
+            <a:off x="7648706" y="3063671"/>
+            <a:ext cx="3350597" cy="1200329"/>
+          </a:xfrm>
+          <a:prstGeom prst="rect">
+            <a:avLst/>
+          </a:prstGeom>
+          <a:noFill/>
+        </p:spPr>
+        <p:txBody>
+          <a:bodyPr wrap="none" rtlCol="0">
+            <a:spAutoFit/>
+          </a:bodyPr>
+          <a:lstStyle/>
+          <a:p>
+            <a:r>
+              <a:rPr lang="en-US" dirty="0"/>
+              <a:t>Here, </a:t>
+            </a:r>
+          </a:p>
+          <a:p>
+            <a:r>
+              <a:rPr lang="en-US" dirty="0">
+                <a:latin typeface="Consolas" panose="020B0609020204030204" pitchFamily="49" charset="0"/>
+                <a:cs typeface="Consolas" panose="020B0609020204030204" pitchFamily="49" charset="0"/>
+              </a:rPr>
+              <a:t>condition_1 == False </a:t>
+            </a:r>
+          </a:p>
+          <a:p>
+            <a:r>
+              <a:rPr lang="en-US" dirty="0">
+                <a:latin typeface="Consolas" panose="020B0609020204030204" pitchFamily="49" charset="0"/>
+                <a:cs typeface="Consolas" panose="020B0609020204030204" pitchFamily="49" charset="0"/>
+              </a:rPr>
+              <a:t>and condition_2 == False </a:t>
+            </a:r>
+          </a:p>
+          <a:p>
+            <a:r>
+              <a:rPr lang="en-US" dirty="0">
+                <a:latin typeface="Consolas" panose="020B0609020204030204" pitchFamily="49" charset="0"/>
+                <a:cs typeface="Consolas" panose="020B0609020204030204" pitchFamily="49" charset="0"/>
+              </a:rPr>
+              <a:t>and condition_3 == False</a:t>
+            </a:r>
+          </a:p>
+        </p:txBody>
+      </p:sp>
+      <p:sp>
+        <p:nvSpPr>
+          <p:cNvPr id="15" name="TextBox 14">
+            <a:extLst>
+              <a:ext uri="{FF2B5EF4-FFF2-40B4-BE49-F238E27FC236}">
+                <a16:creationId xmlns:a16="http://schemas.microsoft.com/office/drawing/2014/main" id="{7CE6CE9C-F282-0046-B314-689EFC9DE483}"/>
+              </a:ext>
+            </a:extLst>
+          </p:cNvPr>
+          <p:cNvSpPr txBox="1"/>
+          <p:nvPr/>
+        </p:nvSpPr>
+        <p:spPr>
+          <a:xfrm>
+            <a:off x="1310343" y="2034528"/>
+            <a:ext cx="3749274" cy="4278094"/>
+          </a:xfrm>
+          <a:prstGeom prst="rect">
+            <a:avLst/>
+          </a:prstGeom>
+          <a:solidFill>
+            <a:schemeClr val="tx1">
+              <a:lumMod val="85000"/>
+              <a:lumOff val="15000"/>
+            </a:schemeClr>
+          </a:solidFill>
+        </p:spPr>
+        <p:txBody>
+          <a:bodyPr wrap="square" rtlCol="0">
+            <a:spAutoFit/>
+          </a:bodyPr>
+          <a:lstStyle/>
+          <a:p>
+            <a:r>
+              <a:rPr lang="en-US" sz="1600" b="1" dirty="0">
+                <a:solidFill>
+                  <a:schemeClr val="bg2">
+                    <a:lumMod val="75000"/>
+                  </a:schemeClr>
+                </a:solidFill>
+                <a:latin typeface="Consolas" panose="020B0609020204030204" pitchFamily="49" charset="0"/>
+                <a:cs typeface="Consolas" panose="020B0609020204030204" pitchFamily="49" charset="0"/>
+              </a:rPr>
+              <a:t>If</a:t>
+            </a:r>
+            <a:r>
+              <a:rPr lang="en-US" sz="1600" dirty="0">
+                <a:solidFill>
+                  <a:schemeClr val="bg2">
+                    <a:lumMod val="75000"/>
+                  </a:schemeClr>
+                </a:solidFill>
+                <a:latin typeface="Consolas" panose="020B0609020204030204" pitchFamily="49" charset="0"/>
+                <a:cs typeface="Consolas" panose="020B0609020204030204" pitchFamily="49" charset="0"/>
+              </a:rPr>
+              <a:t> condition_1 == True:</a:t>
             </a:r>
           </a:p>
           <a:p>
             <a:pPr lvl="1"/>
             <a:r>
-              <a:rPr lang="en-US" dirty="0">
-                <a:solidFill>
-                  <a:schemeClr val="tx2"/>
+              <a:rPr lang="en-US" sz="1600" dirty="0">
+                <a:solidFill>
+                  <a:schemeClr val="bg2">
+                    <a:lumMod val="75000"/>
+                  </a:schemeClr>
                 </a:solidFill>
                 <a:latin typeface="Consolas" panose="020B0609020204030204" pitchFamily="49" charset="0"/>
                 <a:cs typeface="Consolas" panose="020B0609020204030204" pitchFamily="49" charset="0"/>
@@ -10763,9 +10614,11 @@
           <a:p>
             <a:pPr lvl="1"/>
             <a:r>
-              <a:rPr lang="en-US" dirty="0">
-                <a:solidFill>
-                  <a:schemeClr val="tx2"/>
+              <a:rPr lang="en-US" sz="1600" dirty="0">
+                <a:solidFill>
+                  <a:schemeClr val="bg2">
+                    <a:lumMod val="75000"/>
+                  </a:schemeClr>
                 </a:solidFill>
                 <a:latin typeface="Consolas" panose="020B0609020204030204" pitchFamily="49" charset="0"/>
                 <a:cs typeface="Consolas" panose="020B0609020204030204" pitchFamily="49" charset="0"/>
@@ -10776,9 +10629,11 @@
           <a:p>
             <a:pPr lvl="1"/>
             <a:r>
-              <a:rPr lang="en-US" dirty="0">
-                <a:solidFill>
-                  <a:schemeClr val="tx2"/>
+              <a:rPr lang="en-US" sz="1600" i="1" dirty="0">
+                <a:solidFill>
+                  <a:schemeClr val="bg2">
+                    <a:lumMod val="75000"/>
+                  </a:schemeClr>
                 </a:solidFill>
                 <a:latin typeface="Consolas" panose="020B0609020204030204" pitchFamily="49" charset="0"/>
                 <a:cs typeface="Consolas" panose="020B0609020204030204" pitchFamily="49" charset="0"/>
@@ -10787,69 +10642,120 @@
             </a:r>
           </a:p>
           <a:p>
+            <a:r>
+              <a:rPr lang="en-US" sz="1600" b="1" dirty="0">
+                <a:solidFill>
+                  <a:srgbClr val="92D050"/>
+                </a:solidFill>
+                <a:latin typeface="Consolas" panose="020B0609020204030204" pitchFamily="49" charset="0"/>
+                <a:cs typeface="Consolas" panose="020B0609020204030204" pitchFamily="49" charset="0"/>
+              </a:rPr>
+              <a:t>elif</a:t>
+            </a:r>
+            <a:r>
+              <a:rPr lang="en-US" sz="1600" dirty="0">
+                <a:solidFill>
+                  <a:srgbClr val="92D050"/>
+                </a:solidFill>
+                <a:latin typeface="Consolas" panose="020B0609020204030204" pitchFamily="49" charset="0"/>
+                <a:cs typeface="Consolas" panose="020B0609020204030204" pitchFamily="49" charset="0"/>
+              </a:rPr>
+              <a:t> condition_2 == True:</a:t>
+            </a:r>
+          </a:p>
+          <a:p>
             <a:pPr lvl="1"/>
-            <a:endParaRPr lang="en-US" dirty="0">
-              <a:solidFill>
-                <a:schemeClr val="tx2"/>
-              </a:solidFill>
-              <a:latin typeface="Consolas" panose="020B0609020204030204" pitchFamily="49" charset="0"/>
-              <a:cs typeface="Consolas" panose="020B0609020204030204" pitchFamily="49" charset="0"/>
-            </a:endParaRPr>
-          </a:p>
-          <a:p>
-            <a:r>
-              <a:rPr lang="en-US" b="1" dirty="0">
-                <a:solidFill>
-                  <a:schemeClr val="tx2"/>
-                </a:solidFill>
-                <a:latin typeface="Consolas" panose="020B0609020204030204" pitchFamily="49" charset="0"/>
-                <a:cs typeface="Consolas" panose="020B0609020204030204" pitchFamily="49" charset="0"/>
-              </a:rPr>
-              <a:t>for</a:t>
-            </a:r>
-            <a:r>
-              <a:rPr lang="en-US" dirty="0">
-                <a:solidFill>
-                  <a:schemeClr val="tx2"/>
-                </a:solidFill>
-                <a:latin typeface="Consolas" panose="020B0609020204030204" pitchFamily="49" charset="0"/>
-                <a:cs typeface="Consolas" panose="020B0609020204030204" pitchFamily="49" charset="0"/>
-              </a:rPr>
-              <a:t> condition:</a:t>
+            <a:r>
+              <a:rPr lang="en-US" sz="1600" dirty="0">
+                <a:solidFill>
+                  <a:srgbClr val="92D050"/>
+                </a:solidFill>
+                <a:latin typeface="Consolas" panose="020B0609020204030204" pitchFamily="49" charset="0"/>
+                <a:cs typeface="Consolas" panose="020B0609020204030204" pitchFamily="49" charset="0"/>
+              </a:rPr>
+              <a:t># do thing 3</a:t>
             </a:r>
           </a:p>
           <a:p>
             <a:pPr lvl="1"/>
             <a:r>
-              <a:rPr lang="en-US" dirty="0">
-                <a:solidFill>
-                  <a:schemeClr val="tx2"/>
-                </a:solidFill>
-                <a:latin typeface="Consolas" panose="020B0609020204030204" pitchFamily="49" charset="0"/>
-                <a:cs typeface="Consolas" panose="020B0609020204030204" pitchFamily="49" charset="0"/>
-              </a:rPr>
-              <a:t># do thing 1</a:t>
+              <a:rPr lang="en-US" sz="1600" dirty="0">
+                <a:solidFill>
+                  <a:srgbClr val="92D050"/>
+                </a:solidFill>
+                <a:latin typeface="Consolas" panose="020B0609020204030204" pitchFamily="49" charset="0"/>
+                <a:cs typeface="Consolas" panose="020B0609020204030204" pitchFamily="49" charset="0"/>
+              </a:rPr>
+              <a:t># do thing 4</a:t>
             </a:r>
           </a:p>
           <a:p>
             <a:pPr lvl="1"/>
             <a:r>
-              <a:rPr lang="en-US" dirty="0">
-                <a:solidFill>
-                  <a:schemeClr val="tx2"/>
-                </a:solidFill>
-                <a:latin typeface="Consolas" panose="020B0609020204030204" pitchFamily="49" charset="0"/>
-                <a:cs typeface="Consolas" panose="020B0609020204030204" pitchFamily="49" charset="0"/>
-              </a:rPr>
-              <a:t># do thing 2</a:t>
+              <a:rPr lang="en-US" sz="1600" i="1" dirty="0">
+                <a:solidFill>
+                  <a:srgbClr val="92D050"/>
+                </a:solidFill>
+                <a:latin typeface="Consolas" panose="020B0609020204030204" pitchFamily="49" charset="0"/>
+                <a:cs typeface="Consolas" panose="020B0609020204030204" pitchFamily="49" charset="0"/>
+              </a:rPr>
+              <a:t># notice the indentation</a:t>
+            </a:r>
+          </a:p>
+          <a:p>
+            <a:r>
+              <a:rPr lang="en-US" sz="1600" b="1" dirty="0">
+                <a:solidFill>
+                  <a:srgbClr val="FFFF00"/>
+                </a:solidFill>
+                <a:latin typeface="Consolas" panose="020B0609020204030204" pitchFamily="49" charset="0"/>
+                <a:cs typeface="Consolas" panose="020B0609020204030204" pitchFamily="49" charset="0"/>
+              </a:rPr>
+              <a:t>elif</a:t>
+            </a:r>
+            <a:r>
+              <a:rPr lang="en-US" sz="1600" dirty="0">
+                <a:solidFill>
+                  <a:srgbClr val="FFFF00"/>
+                </a:solidFill>
+                <a:latin typeface="Consolas" panose="020B0609020204030204" pitchFamily="49" charset="0"/>
+                <a:cs typeface="Consolas" panose="020B0609020204030204" pitchFamily="49" charset="0"/>
+              </a:rPr>
+              <a:t> condition_3 == True:</a:t>
             </a:r>
           </a:p>
           <a:p>
             <a:pPr lvl="1"/>
             <a:r>
-              <a:rPr lang="en-US" dirty="0">
-                <a:solidFill>
-                  <a:schemeClr val="tx2"/>
+              <a:rPr lang="en-US" sz="1600" dirty="0">
+                <a:solidFill>
+                  <a:srgbClr val="FFFF00"/>
+                </a:solidFill>
+                <a:latin typeface="Consolas" panose="020B0609020204030204" pitchFamily="49" charset="0"/>
+                <a:cs typeface="Consolas" panose="020B0609020204030204" pitchFamily="49" charset="0"/>
+              </a:rPr>
+              <a:t># do thing 5</a:t>
+            </a:r>
+          </a:p>
+          <a:p>
+            <a:pPr lvl="1"/>
+            <a:r>
+              <a:rPr lang="en-US" sz="1600" dirty="0">
+                <a:solidFill>
+                  <a:srgbClr val="FFFF00"/>
+                </a:solidFill>
+                <a:latin typeface="Consolas" panose="020B0609020204030204" pitchFamily="49" charset="0"/>
+                <a:cs typeface="Consolas" panose="020B0609020204030204" pitchFamily="49" charset="0"/>
+              </a:rPr>
+              <a:t># do thing 6</a:t>
+            </a:r>
+          </a:p>
+          <a:p>
+            <a:pPr lvl="1"/>
+            <a:r>
+              <a:rPr lang="en-US" sz="1600" i="1" dirty="0">
+                <a:solidFill>
+                  <a:srgbClr val="FFFF00"/>
                 </a:solidFill>
                 <a:latin typeface="Consolas" panose="020B0609020204030204" pitchFamily="49" charset="0"/>
                 <a:cs typeface="Consolas" panose="020B0609020204030204" pitchFamily="49" charset="0"/>
@@ -10858,309 +10764,65 @@
             </a:r>
           </a:p>
           <a:p>
-            <a:endParaRPr lang="en-US" dirty="0">
-              <a:solidFill>
-                <a:schemeClr val="tx2"/>
-              </a:solidFill>
-              <a:latin typeface="Consolas" panose="020B0609020204030204" pitchFamily="49" charset="0"/>
-              <a:cs typeface="Consolas" panose="020B0609020204030204" pitchFamily="49" charset="0"/>
-            </a:endParaRPr>
-          </a:p>
-          <a:p>
-            <a:r>
-              <a:rPr lang="en-US" b="1" dirty="0">
-                <a:solidFill>
-                  <a:schemeClr val="tx2"/>
-                </a:solidFill>
-                <a:latin typeface="Consolas" panose="020B0609020204030204" pitchFamily="49" charset="0"/>
-                <a:cs typeface="Consolas" panose="020B0609020204030204" pitchFamily="49" charset="0"/>
-              </a:rPr>
-              <a:t>for </a:t>
-            </a:r>
-            <a:r>
-              <a:rPr lang="en-US" dirty="0">
-                <a:solidFill>
-                  <a:schemeClr val="tx2"/>
-                </a:solidFill>
-                <a:latin typeface="Consolas" panose="020B0609020204030204" pitchFamily="49" charset="0"/>
-                <a:cs typeface="Consolas" panose="020B0609020204030204" pitchFamily="49" charset="0"/>
-              </a:rPr>
-              <a:t>and </a:t>
-            </a:r>
-            <a:r>
-              <a:rPr lang="en-US" b="1" dirty="0">
-                <a:solidFill>
-                  <a:schemeClr val="tx2"/>
-                </a:solidFill>
-                <a:latin typeface="Consolas" panose="020B0609020204030204" pitchFamily="49" charset="0"/>
-                <a:cs typeface="Consolas" panose="020B0609020204030204" pitchFamily="49" charset="0"/>
-              </a:rPr>
-              <a:t>while </a:t>
-            </a:r>
-            <a:r>
-              <a:rPr lang="en-US" dirty="0">
-                <a:solidFill>
-                  <a:schemeClr val="tx2"/>
-                </a:solidFill>
-                <a:latin typeface="Consolas" panose="020B0609020204030204" pitchFamily="49" charset="0"/>
-                <a:cs typeface="Consolas" panose="020B0609020204030204" pitchFamily="49" charset="0"/>
-              </a:rPr>
-              <a:t>are similar, usage is dependent on </a:t>
-            </a:r>
-            <a:r>
-              <a:rPr lang="en-US" i="1" dirty="0">
-                <a:solidFill>
-                  <a:schemeClr val="tx2"/>
-                </a:solidFill>
-                <a:latin typeface="Consolas" panose="020B0609020204030204" pitchFamily="49" charset="0"/>
-                <a:cs typeface="Consolas" panose="020B0609020204030204" pitchFamily="49" charset="0"/>
-              </a:rPr>
-              <a:t>code-clarity</a:t>
-            </a:r>
-          </a:p>
-          <a:p>
-            <a:r>
-              <a:rPr lang="en-US" b="1" dirty="0">
-                <a:solidFill>
-                  <a:schemeClr val="tx2"/>
-                </a:solidFill>
-                <a:latin typeface="Consolas" panose="020B0609020204030204" pitchFamily="49" charset="0"/>
-                <a:cs typeface="Consolas" panose="020B0609020204030204" pitchFamily="49" charset="0"/>
-              </a:rPr>
-              <a:t>for </a:t>
-            </a:r>
-            <a:r>
-              <a:rPr lang="en-US" dirty="0">
-                <a:solidFill>
-                  <a:schemeClr val="tx2"/>
-                </a:solidFill>
-                <a:latin typeface="Consolas" panose="020B0609020204030204" pitchFamily="49" charset="0"/>
-                <a:cs typeface="Consolas" panose="020B0609020204030204" pitchFamily="49" charset="0"/>
-              </a:rPr>
-              <a:t>is usually used to </a:t>
-            </a:r>
-            <a:r>
-              <a:rPr lang="en-US" i="1" dirty="0">
-                <a:solidFill>
-                  <a:schemeClr val="tx2"/>
-                </a:solidFill>
-                <a:latin typeface="Consolas" panose="020B0609020204030204" pitchFamily="49" charset="0"/>
-                <a:cs typeface="Consolas" panose="020B0609020204030204" pitchFamily="49" charset="0"/>
-              </a:rPr>
-              <a:t>iterate</a:t>
-            </a:r>
-            <a:r>
-              <a:rPr lang="en-US" dirty="0">
-                <a:solidFill>
-                  <a:schemeClr val="tx2"/>
-                </a:solidFill>
-                <a:latin typeface="Consolas" panose="020B0609020204030204" pitchFamily="49" charset="0"/>
-                <a:cs typeface="Consolas" panose="020B0609020204030204" pitchFamily="49" charset="0"/>
-              </a:rPr>
-              <a:t> a </a:t>
-            </a:r>
-            <a:r>
-              <a:rPr lang="en-US" i="1" dirty="0">
-                <a:solidFill>
-                  <a:schemeClr val="tx2"/>
-                </a:solidFill>
-                <a:latin typeface="Consolas" panose="020B0609020204030204" pitchFamily="49" charset="0"/>
-                <a:cs typeface="Consolas" panose="020B0609020204030204" pitchFamily="49" charset="0"/>
-              </a:rPr>
-              <a:t>sequence </a:t>
-            </a:r>
-            <a:r>
-              <a:rPr lang="en-US" dirty="0">
-                <a:solidFill>
-                  <a:schemeClr val="tx2"/>
-                </a:solidFill>
-                <a:latin typeface="Consolas" panose="020B0609020204030204" pitchFamily="49" charset="0"/>
-                <a:cs typeface="Consolas" panose="020B0609020204030204" pitchFamily="49" charset="0"/>
-              </a:rPr>
-              <a:t>(We will talk about this in another session)</a:t>
-            </a:r>
-            <a:endParaRPr lang="en-US" b="1" i="1" dirty="0">
-              <a:solidFill>
-                <a:schemeClr val="tx2"/>
-              </a:solidFill>
-              <a:latin typeface="Consolas" panose="020B0609020204030204" pitchFamily="49" charset="0"/>
-              <a:cs typeface="Consolas" panose="020B0609020204030204" pitchFamily="49" charset="0"/>
-            </a:endParaRPr>
-          </a:p>
-          <a:p>
-            <a:r>
-              <a:rPr lang="en-US" b="1" dirty="0">
-                <a:solidFill>
-                  <a:schemeClr val="tx2"/>
-                </a:solidFill>
-                <a:latin typeface="Consolas" panose="020B0609020204030204" pitchFamily="49" charset="0"/>
-                <a:cs typeface="Consolas" panose="020B0609020204030204" pitchFamily="49" charset="0"/>
-              </a:rPr>
-              <a:t>for </a:t>
-            </a:r>
-            <a:r>
-              <a:rPr lang="en-US" dirty="0">
-                <a:solidFill>
-                  <a:schemeClr val="tx2"/>
-                </a:solidFill>
-                <a:latin typeface="Consolas" panose="020B0609020204030204" pitchFamily="49" charset="0"/>
-                <a:cs typeface="Consolas" panose="020B0609020204030204" pitchFamily="49" charset="0"/>
-              </a:rPr>
-              <a:t>and </a:t>
-            </a:r>
-            <a:r>
-              <a:rPr lang="en-US" b="1" dirty="0">
-                <a:solidFill>
-                  <a:schemeClr val="tx2"/>
-                </a:solidFill>
-                <a:latin typeface="Consolas" panose="020B0609020204030204" pitchFamily="49" charset="0"/>
-                <a:cs typeface="Consolas" panose="020B0609020204030204" pitchFamily="49" charset="0"/>
-              </a:rPr>
-              <a:t>while </a:t>
-            </a:r>
-            <a:r>
-              <a:rPr lang="en-US" dirty="0">
-                <a:solidFill>
-                  <a:schemeClr val="tx2"/>
-                </a:solidFill>
-                <a:latin typeface="Consolas" panose="020B0609020204030204" pitchFamily="49" charset="0"/>
-                <a:cs typeface="Consolas" panose="020B0609020204030204" pitchFamily="49" charset="0"/>
-              </a:rPr>
-              <a:t>are used to create a </a:t>
-            </a:r>
-            <a:r>
-              <a:rPr lang="en-US" b="1" i="1" dirty="0">
-                <a:solidFill>
-                  <a:schemeClr val="tx2"/>
-                </a:solidFill>
-                <a:latin typeface="Consolas" panose="020B0609020204030204" pitchFamily="49" charset="0"/>
-                <a:cs typeface="Consolas" panose="020B0609020204030204" pitchFamily="49" charset="0"/>
-              </a:rPr>
-              <a:t>loop</a:t>
-            </a:r>
-            <a:r>
-              <a:rPr lang="en-US" dirty="0">
-                <a:solidFill>
-                  <a:schemeClr val="tx2"/>
-                </a:solidFill>
-                <a:latin typeface="Consolas" panose="020B0609020204030204" pitchFamily="49" charset="0"/>
-                <a:cs typeface="Consolas" panose="020B0609020204030204" pitchFamily="49" charset="0"/>
-              </a:rPr>
-              <a:t> of execution</a:t>
+            <a:r>
+              <a:rPr lang="en-US" sz="1600" i="1" dirty="0">
+                <a:solidFill>
+                  <a:schemeClr val="accent1"/>
+                </a:solidFill>
+                <a:latin typeface="Consolas" panose="020B0609020204030204" pitchFamily="49" charset="0"/>
+                <a:cs typeface="Consolas" panose="020B0609020204030204" pitchFamily="49" charset="0"/>
+              </a:rPr>
+              <a:t>else:</a:t>
             </a:r>
           </a:p>
           <a:p>
             <a:pPr lvl="1"/>
             <a:r>
-              <a:rPr lang="en-US" dirty="0">
-                <a:solidFill>
-                  <a:schemeClr val="tx2"/>
-                </a:solidFill>
-                <a:latin typeface="Consolas" panose="020B0609020204030204" pitchFamily="49" charset="0"/>
-                <a:cs typeface="Consolas" panose="020B0609020204030204" pitchFamily="49" charset="0"/>
-              </a:rPr>
-              <a:t>As opposed to an </a:t>
-            </a:r>
-            <a:r>
-              <a:rPr lang="en-US" b="1" dirty="0">
-                <a:solidFill>
-                  <a:schemeClr val="tx2"/>
-                </a:solidFill>
-                <a:latin typeface="Consolas" panose="020B0609020204030204" pitchFamily="49" charset="0"/>
-                <a:cs typeface="Consolas" panose="020B0609020204030204" pitchFamily="49" charset="0"/>
-              </a:rPr>
-              <a:t>if</a:t>
-            </a:r>
-            <a:r>
-              <a:rPr lang="en-US" dirty="0">
-                <a:solidFill>
-                  <a:schemeClr val="tx2"/>
-                </a:solidFill>
-                <a:latin typeface="Consolas" panose="020B0609020204030204" pitchFamily="49" charset="0"/>
-                <a:cs typeface="Consolas" panose="020B0609020204030204" pitchFamily="49" charset="0"/>
-              </a:rPr>
-              <a:t> condition which is executed only once</a:t>
+              <a:rPr lang="en-US" sz="1600" dirty="0">
+                <a:solidFill>
+                  <a:schemeClr val="accent1"/>
+                </a:solidFill>
+                <a:latin typeface="Consolas" panose="020B0609020204030204" pitchFamily="49" charset="0"/>
+                <a:cs typeface="Consolas" panose="020B0609020204030204" pitchFamily="49" charset="0"/>
+              </a:rPr>
+              <a:t># do thing 7</a:t>
             </a:r>
           </a:p>
           <a:p>
             <a:pPr lvl="1"/>
-            <a:endParaRPr lang="en-US" dirty="0">
-              <a:solidFill>
-                <a:schemeClr val="tx2"/>
-              </a:solidFill>
-              <a:latin typeface="Consolas" panose="020B0609020204030204" pitchFamily="49" charset="0"/>
-              <a:cs typeface="Consolas" panose="020B0609020204030204" pitchFamily="49" charset="0"/>
-            </a:endParaRPr>
-          </a:p>
-          <a:p>
-            <a:r>
-              <a:rPr lang="en-US" dirty="0">
-                <a:solidFill>
-                  <a:schemeClr val="tx2"/>
-                </a:solidFill>
-                <a:latin typeface="Consolas" panose="020B0609020204030204" pitchFamily="49" charset="0"/>
-                <a:cs typeface="Consolas" panose="020B0609020204030204" pitchFamily="49" charset="0"/>
-              </a:rPr>
-              <a:t>condition, in above </a:t>
-            </a:r>
-            <a:r>
-              <a:rPr lang="en-US" i="1" dirty="0">
-                <a:solidFill>
-                  <a:schemeClr val="tx2"/>
-                </a:solidFill>
-                <a:latin typeface="Consolas" panose="020B0609020204030204" pitchFamily="49" charset="0"/>
-                <a:cs typeface="Consolas" panose="020B0609020204030204" pitchFamily="49" charset="0"/>
-              </a:rPr>
-              <a:t>expressions</a:t>
-            </a:r>
-            <a:r>
-              <a:rPr lang="en-US" dirty="0">
-                <a:solidFill>
-                  <a:schemeClr val="tx2"/>
-                </a:solidFill>
-                <a:latin typeface="Consolas" panose="020B0609020204030204" pitchFamily="49" charset="0"/>
-                <a:cs typeface="Consolas" panose="020B0609020204030204" pitchFamily="49" charset="0"/>
-              </a:rPr>
-              <a:t>, ought to evaluate to a </a:t>
-            </a:r>
-            <a:r>
-              <a:rPr lang="en-US" i="1" dirty="0">
-                <a:solidFill>
-                  <a:schemeClr val="tx2"/>
-                </a:solidFill>
-                <a:latin typeface="Consolas" panose="020B0609020204030204" pitchFamily="49" charset="0"/>
-                <a:cs typeface="Consolas" panose="020B0609020204030204" pitchFamily="49" charset="0"/>
-              </a:rPr>
-              <a:t>boolean data-type</a:t>
-            </a:r>
-            <a:endParaRPr lang="en-US" i="1" dirty="0">
-              <a:solidFill>
-                <a:schemeClr val="tx2"/>
-              </a:solidFill>
-            </a:endParaRPr>
+            <a:r>
+              <a:rPr lang="en-US" sz="1600" dirty="0">
+                <a:solidFill>
+                  <a:schemeClr val="accent1"/>
+                </a:solidFill>
+                <a:latin typeface="Consolas" panose="020B0609020204030204" pitchFamily="49" charset="0"/>
+                <a:cs typeface="Consolas" panose="020B0609020204030204" pitchFamily="49" charset="0"/>
+              </a:rPr>
+              <a:t># do thing 8</a:t>
+            </a:r>
           </a:p>
           <a:p>
             <a:pPr lvl="1"/>
-            <a:endParaRPr lang="en-US" dirty="0">
-              <a:solidFill>
-                <a:schemeClr val="tx2"/>
-              </a:solidFill>
-            </a:endParaRPr>
-          </a:p>
-          <a:p>
-            <a:pPr lvl="1"/>
-            <a:endParaRPr lang="en-US" dirty="0">
-              <a:solidFill>
-                <a:schemeClr val="tx2"/>
-              </a:solidFill>
-            </a:endParaRPr>
+            <a:r>
+              <a:rPr lang="en-US" sz="1600" i="1" dirty="0">
+                <a:solidFill>
+                  <a:schemeClr val="accent1"/>
+                </a:solidFill>
+                <a:latin typeface="Consolas" panose="020B0609020204030204" pitchFamily="49" charset="0"/>
+                <a:cs typeface="Consolas" panose="020B0609020204030204" pitchFamily="49" charset="0"/>
+              </a:rPr>
+              <a:t># notice the indentation</a:t>
+            </a:r>
+          </a:p>
+          <a:p>
+            <a:endParaRPr lang="en-US" sz="1600" dirty="0"/>
           </a:p>
         </p:txBody>
       </p:sp>
     </p:spTree>
     <p:extLst>
       <p:ext uri="{BB962C8B-B14F-4D97-AF65-F5344CB8AC3E}">
-        <p14:creationId xmlns:p14="http://schemas.microsoft.com/office/powerpoint/2010/main" val="1269644968"/>
+        <p14:creationId xmlns:p14="http://schemas.microsoft.com/office/powerpoint/2010/main" val="2318328884"/>
       </p:ext>
     </p:extLst>
   </p:cSld>
@@ -11392,6 +11054,503 @@
 <file path=ppt/slides/slide3.xml><?xml version="1.0" encoding="utf-8"?>
 <p:sld xmlns:a="http://schemas.openxmlformats.org/drawingml/2006/main" xmlns:r="http://schemas.openxmlformats.org/officeDocument/2006/relationships" xmlns:p="http://schemas.openxmlformats.org/presentationml/2006/main">
   <p:cSld>
+    <p:bg>
+      <p:bgPr>
+        <a:solidFill>
+          <a:schemeClr val="bg1"/>
+        </a:solidFill>
+        <a:effectLst/>
+      </p:bgPr>
+    </p:bg>
+    <p:spTree>
+      <p:nvGrpSpPr>
+        <p:cNvPr id="1" name=""/>
+        <p:cNvGrpSpPr/>
+        <p:nvPr/>
+      </p:nvGrpSpPr>
+      <p:grpSpPr>
+        <a:xfrm>
+          <a:off x="0" y="0"/>
+          <a:ext cx="0" cy="0"/>
+          <a:chOff x="0" y="0"/>
+          <a:chExt cx="0" cy="0"/>
+        </a:xfrm>
+      </p:grpSpPr>
+      <p:sp>
+        <p:nvSpPr>
+          <p:cNvPr id="3" name="Content Placeholder 2">
+            <a:extLst>
+              <a:ext uri="{FF2B5EF4-FFF2-40B4-BE49-F238E27FC236}">
+                <a16:creationId xmlns:a16="http://schemas.microsoft.com/office/drawing/2014/main" id="{E82EBBE1-3A6B-1C40-862C-EED1C505C3ED}"/>
+              </a:ext>
+            </a:extLst>
+          </p:cNvPr>
+          <p:cNvSpPr>
+            <a:spLocks noGrp="1"/>
+          </p:cNvSpPr>
+          <p:nvPr>
+            <p:ph idx="1"/>
+          </p:nvPr>
+        </p:nvSpPr>
+        <p:spPr>
+          <a:xfrm>
+            <a:off x="970059" y="834887"/>
+            <a:ext cx="9997661" cy="5130824"/>
+          </a:xfrm>
+        </p:spPr>
+        <p:txBody>
+          <a:bodyPr>
+            <a:normAutofit fontScale="70000" lnSpcReduction="20000"/>
+          </a:bodyPr>
+          <a:lstStyle/>
+          <a:p>
+            <a:r>
+              <a:rPr lang="en-US" b="1" dirty="0">
+                <a:solidFill>
+                  <a:schemeClr val="tx2"/>
+                </a:solidFill>
+                <a:latin typeface="Consolas" panose="020B0609020204030204" pitchFamily="49" charset="0"/>
+                <a:cs typeface="Consolas" panose="020B0609020204030204" pitchFamily="49" charset="0"/>
+              </a:rPr>
+              <a:t>while</a:t>
+            </a:r>
+            <a:r>
+              <a:rPr lang="en-US" dirty="0">
+                <a:solidFill>
+                  <a:schemeClr val="tx2"/>
+                </a:solidFill>
+                <a:latin typeface="Consolas" panose="020B0609020204030204" pitchFamily="49" charset="0"/>
+                <a:cs typeface="Consolas" panose="020B0609020204030204" pitchFamily="49" charset="0"/>
+              </a:rPr>
+              <a:t> condition:</a:t>
+            </a:r>
+          </a:p>
+          <a:p>
+            <a:pPr lvl="1"/>
+            <a:r>
+              <a:rPr lang="en-US" dirty="0">
+                <a:solidFill>
+                  <a:schemeClr val="tx2"/>
+                </a:solidFill>
+                <a:latin typeface="Consolas" panose="020B0609020204030204" pitchFamily="49" charset="0"/>
+                <a:cs typeface="Consolas" panose="020B0609020204030204" pitchFamily="49" charset="0"/>
+              </a:rPr>
+              <a:t># do thing 1</a:t>
+            </a:r>
+          </a:p>
+          <a:p>
+            <a:pPr lvl="1"/>
+            <a:r>
+              <a:rPr lang="en-US" dirty="0">
+                <a:solidFill>
+                  <a:schemeClr val="tx2"/>
+                </a:solidFill>
+                <a:latin typeface="Consolas" panose="020B0609020204030204" pitchFamily="49" charset="0"/>
+                <a:cs typeface="Consolas" panose="020B0609020204030204" pitchFamily="49" charset="0"/>
+              </a:rPr>
+              <a:t># do thing 2</a:t>
+            </a:r>
+          </a:p>
+          <a:p>
+            <a:pPr lvl="1"/>
+            <a:r>
+              <a:rPr lang="en-US" dirty="0">
+                <a:solidFill>
+                  <a:schemeClr val="tx2"/>
+                </a:solidFill>
+                <a:latin typeface="Consolas" panose="020B0609020204030204" pitchFamily="49" charset="0"/>
+                <a:cs typeface="Consolas" panose="020B0609020204030204" pitchFamily="49" charset="0"/>
+              </a:rPr>
+              <a:t># notice the indentation</a:t>
+            </a:r>
+          </a:p>
+          <a:p>
+            <a:pPr lvl="1"/>
+            <a:endParaRPr lang="en-US" dirty="0">
+              <a:solidFill>
+                <a:schemeClr val="tx2"/>
+              </a:solidFill>
+              <a:latin typeface="Consolas" panose="020B0609020204030204" pitchFamily="49" charset="0"/>
+              <a:cs typeface="Consolas" panose="020B0609020204030204" pitchFamily="49" charset="0"/>
+            </a:endParaRPr>
+          </a:p>
+          <a:p>
+            <a:r>
+              <a:rPr lang="en-US" b="1" dirty="0">
+                <a:solidFill>
+                  <a:schemeClr val="tx2"/>
+                </a:solidFill>
+                <a:latin typeface="Consolas" panose="020B0609020204030204" pitchFamily="49" charset="0"/>
+                <a:cs typeface="Consolas" panose="020B0609020204030204" pitchFamily="49" charset="0"/>
+              </a:rPr>
+              <a:t>for</a:t>
+            </a:r>
+            <a:r>
+              <a:rPr lang="en-US" dirty="0">
+                <a:solidFill>
+                  <a:schemeClr val="tx2"/>
+                </a:solidFill>
+                <a:latin typeface="Consolas" panose="020B0609020204030204" pitchFamily="49" charset="0"/>
+                <a:cs typeface="Consolas" panose="020B0609020204030204" pitchFamily="49" charset="0"/>
+              </a:rPr>
+              <a:t> condition:</a:t>
+            </a:r>
+          </a:p>
+          <a:p>
+            <a:pPr lvl="1"/>
+            <a:r>
+              <a:rPr lang="en-US" dirty="0">
+                <a:solidFill>
+                  <a:schemeClr val="tx2"/>
+                </a:solidFill>
+                <a:latin typeface="Consolas" panose="020B0609020204030204" pitchFamily="49" charset="0"/>
+                <a:cs typeface="Consolas" panose="020B0609020204030204" pitchFamily="49" charset="0"/>
+              </a:rPr>
+              <a:t># do thing 1</a:t>
+            </a:r>
+          </a:p>
+          <a:p>
+            <a:pPr lvl="1"/>
+            <a:r>
+              <a:rPr lang="en-US" dirty="0">
+                <a:solidFill>
+                  <a:schemeClr val="tx2"/>
+                </a:solidFill>
+                <a:latin typeface="Consolas" panose="020B0609020204030204" pitchFamily="49" charset="0"/>
+                <a:cs typeface="Consolas" panose="020B0609020204030204" pitchFamily="49" charset="0"/>
+              </a:rPr>
+              <a:t># do thing 2</a:t>
+            </a:r>
+          </a:p>
+          <a:p>
+            <a:pPr lvl="1"/>
+            <a:r>
+              <a:rPr lang="en-US" dirty="0">
+                <a:solidFill>
+                  <a:schemeClr val="tx2"/>
+                </a:solidFill>
+                <a:latin typeface="Consolas" panose="020B0609020204030204" pitchFamily="49" charset="0"/>
+                <a:cs typeface="Consolas" panose="020B0609020204030204" pitchFamily="49" charset="0"/>
+              </a:rPr>
+              <a:t># notice the indentation</a:t>
+            </a:r>
+          </a:p>
+          <a:p>
+            <a:endParaRPr lang="en-US" dirty="0">
+              <a:solidFill>
+                <a:schemeClr val="tx2"/>
+              </a:solidFill>
+              <a:latin typeface="Consolas" panose="020B0609020204030204" pitchFamily="49" charset="0"/>
+              <a:cs typeface="Consolas" panose="020B0609020204030204" pitchFamily="49" charset="0"/>
+            </a:endParaRPr>
+          </a:p>
+          <a:p>
+            <a:r>
+              <a:rPr lang="en-US" b="1" dirty="0">
+                <a:solidFill>
+                  <a:schemeClr val="tx2"/>
+                </a:solidFill>
+                <a:latin typeface="Consolas" panose="020B0609020204030204" pitchFamily="49" charset="0"/>
+                <a:cs typeface="Consolas" panose="020B0609020204030204" pitchFamily="49" charset="0"/>
+              </a:rPr>
+              <a:t>for </a:t>
+            </a:r>
+            <a:r>
+              <a:rPr lang="en-US" dirty="0">
+                <a:solidFill>
+                  <a:schemeClr val="tx2"/>
+                </a:solidFill>
+                <a:latin typeface="Consolas" panose="020B0609020204030204" pitchFamily="49" charset="0"/>
+                <a:cs typeface="Consolas" panose="020B0609020204030204" pitchFamily="49" charset="0"/>
+              </a:rPr>
+              <a:t>and </a:t>
+            </a:r>
+            <a:r>
+              <a:rPr lang="en-US" b="1" dirty="0">
+                <a:solidFill>
+                  <a:schemeClr val="tx2"/>
+                </a:solidFill>
+                <a:latin typeface="Consolas" panose="020B0609020204030204" pitchFamily="49" charset="0"/>
+                <a:cs typeface="Consolas" panose="020B0609020204030204" pitchFamily="49" charset="0"/>
+              </a:rPr>
+              <a:t>while </a:t>
+            </a:r>
+            <a:r>
+              <a:rPr lang="en-US" dirty="0">
+                <a:solidFill>
+                  <a:schemeClr val="tx2"/>
+                </a:solidFill>
+                <a:latin typeface="Consolas" panose="020B0609020204030204" pitchFamily="49" charset="0"/>
+                <a:cs typeface="Consolas" panose="020B0609020204030204" pitchFamily="49" charset="0"/>
+              </a:rPr>
+              <a:t>are similar, usage is dependent on </a:t>
+            </a:r>
+            <a:r>
+              <a:rPr lang="en-US" i="1" dirty="0">
+                <a:solidFill>
+                  <a:schemeClr val="tx2"/>
+                </a:solidFill>
+                <a:latin typeface="Consolas" panose="020B0609020204030204" pitchFamily="49" charset="0"/>
+                <a:cs typeface="Consolas" panose="020B0609020204030204" pitchFamily="49" charset="0"/>
+              </a:rPr>
+              <a:t>code-clarity</a:t>
+            </a:r>
+          </a:p>
+          <a:p>
+            <a:r>
+              <a:rPr lang="en-US" b="1" dirty="0">
+                <a:solidFill>
+                  <a:schemeClr val="tx2"/>
+                </a:solidFill>
+                <a:latin typeface="Consolas" panose="020B0609020204030204" pitchFamily="49" charset="0"/>
+                <a:cs typeface="Consolas" panose="020B0609020204030204" pitchFamily="49" charset="0"/>
+              </a:rPr>
+              <a:t>for </a:t>
+            </a:r>
+            <a:r>
+              <a:rPr lang="en-US" dirty="0">
+                <a:solidFill>
+                  <a:schemeClr val="tx2"/>
+                </a:solidFill>
+                <a:latin typeface="Consolas" panose="020B0609020204030204" pitchFamily="49" charset="0"/>
+                <a:cs typeface="Consolas" panose="020B0609020204030204" pitchFamily="49" charset="0"/>
+              </a:rPr>
+              <a:t>is usually used to </a:t>
+            </a:r>
+            <a:r>
+              <a:rPr lang="en-US" i="1" dirty="0">
+                <a:solidFill>
+                  <a:schemeClr val="tx2"/>
+                </a:solidFill>
+                <a:latin typeface="Consolas" panose="020B0609020204030204" pitchFamily="49" charset="0"/>
+                <a:cs typeface="Consolas" panose="020B0609020204030204" pitchFamily="49" charset="0"/>
+              </a:rPr>
+              <a:t>iterate</a:t>
+            </a:r>
+            <a:r>
+              <a:rPr lang="en-US" dirty="0">
+                <a:solidFill>
+                  <a:schemeClr val="tx2"/>
+                </a:solidFill>
+                <a:latin typeface="Consolas" panose="020B0609020204030204" pitchFamily="49" charset="0"/>
+                <a:cs typeface="Consolas" panose="020B0609020204030204" pitchFamily="49" charset="0"/>
+              </a:rPr>
+              <a:t> a </a:t>
+            </a:r>
+            <a:r>
+              <a:rPr lang="en-US" i="1" dirty="0">
+                <a:solidFill>
+                  <a:schemeClr val="tx2"/>
+                </a:solidFill>
+                <a:latin typeface="Consolas" panose="020B0609020204030204" pitchFamily="49" charset="0"/>
+                <a:cs typeface="Consolas" panose="020B0609020204030204" pitchFamily="49" charset="0"/>
+              </a:rPr>
+              <a:t>sequence </a:t>
+            </a:r>
+            <a:r>
+              <a:rPr lang="en-US" dirty="0">
+                <a:solidFill>
+                  <a:schemeClr val="tx2"/>
+                </a:solidFill>
+                <a:latin typeface="Consolas" panose="020B0609020204030204" pitchFamily="49" charset="0"/>
+                <a:cs typeface="Consolas" panose="020B0609020204030204" pitchFamily="49" charset="0"/>
+              </a:rPr>
+              <a:t>(We will talk about this in another session)</a:t>
+            </a:r>
+            <a:endParaRPr lang="en-US" b="1" i="1" dirty="0">
+              <a:solidFill>
+                <a:schemeClr val="tx2"/>
+              </a:solidFill>
+              <a:latin typeface="Consolas" panose="020B0609020204030204" pitchFamily="49" charset="0"/>
+              <a:cs typeface="Consolas" panose="020B0609020204030204" pitchFamily="49" charset="0"/>
+            </a:endParaRPr>
+          </a:p>
+          <a:p>
+            <a:r>
+              <a:rPr lang="en-US" b="1" dirty="0">
+                <a:solidFill>
+                  <a:schemeClr val="tx2"/>
+                </a:solidFill>
+                <a:latin typeface="Consolas" panose="020B0609020204030204" pitchFamily="49" charset="0"/>
+                <a:cs typeface="Consolas" panose="020B0609020204030204" pitchFamily="49" charset="0"/>
+              </a:rPr>
+              <a:t>for </a:t>
+            </a:r>
+            <a:r>
+              <a:rPr lang="en-US" dirty="0">
+                <a:solidFill>
+                  <a:schemeClr val="tx2"/>
+                </a:solidFill>
+                <a:latin typeface="Consolas" panose="020B0609020204030204" pitchFamily="49" charset="0"/>
+                <a:cs typeface="Consolas" panose="020B0609020204030204" pitchFamily="49" charset="0"/>
+              </a:rPr>
+              <a:t>and </a:t>
+            </a:r>
+            <a:r>
+              <a:rPr lang="en-US" b="1" dirty="0">
+                <a:solidFill>
+                  <a:schemeClr val="tx2"/>
+                </a:solidFill>
+                <a:latin typeface="Consolas" panose="020B0609020204030204" pitchFamily="49" charset="0"/>
+                <a:cs typeface="Consolas" panose="020B0609020204030204" pitchFamily="49" charset="0"/>
+              </a:rPr>
+              <a:t>while </a:t>
+            </a:r>
+            <a:r>
+              <a:rPr lang="en-US" dirty="0">
+                <a:solidFill>
+                  <a:schemeClr val="tx2"/>
+                </a:solidFill>
+                <a:latin typeface="Consolas" panose="020B0609020204030204" pitchFamily="49" charset="0"/>
+                <a:cs typeface="Consolas" panose="020B0609020204030204" pitchFamily="49" charset="0"/>
+              </a:rPr>
+              <a:t>are used to create a </a:t>
+            </a:r>
+            <a:r>
+              <a:rPr lang="en-US" b="1" i="1" dirty="0">
+                <a:solidFill>
+                  <a:schemeClr val="tx2"/>
+                </a:solidFill>
+                <a:latin typeface="Consolas" panose="020B0609020204030204" pitchFamily="49" charset="0"/>
+                <a:cs typeface="Consolas" panose="020B0609020204030204" pitchFamily="49" charset="0"/>
+              </a:rPr>
+              <a:t>loop</a:t>
+            </a:r>
+            <a:r>
+              <a:rPr lang="en-US" dirty="0">
+                <a:solidFill>
+                  <a:schemeClr val="tx2"/>
+                </a:solidFill>
+                <a:latin typeface="Consolas" panose="020B0609020204030204" pitchFamily="49" charset="0"/>
+                <a:cs typeface="Consolas" panose="020B0609020204030204" pitchFamily="49" charset="0"/>
+              </a:rPr>
+              <a:t> of execution</a:t>
+            </a:r>
+          </a:p>
+          <a:p>
+            <a:pPr lvl="1"/>
+            <a:r>
+              <a:rPr lang="en-US" dirty="0">
+                <a:solidFill>
+                  <a:schemeClr val="tx2"/>
+                </a:solidFill>
+                <a:latin typeface="Consolas" panose="020B0609020204030204" pitchFamily="49" charset="0"/>
+                <a:cs typeface="Consolas" panose="020B0609020204030204" pitchFamily="49" charset="0"/>
+              </a:rPr>
+              <a:t>As opposed to an </a:t>
+            </a:r>
+            <a:r>
+              <a:rPr lang="en-US" b="1" dirty="0">
+                <a:solidFill>
+                  <a:schemeClr val="tx2"/>
+                </a:solidFill>
+                <a:latin typeface="Consolas" panose="020B0609020204030204" pitchFamily="49" charset="0"/>
+                <a:cs typeface="Consolas" panose="020B0609020204030204" pitchFamily="49" charset="0"/>
+              </a:rPr>
+              <a:t>if</a:t>
+            </a:r>
+            <a:r>
+              <a:rPr lang="en-US" dirty="0">
+                <a:solidFill>
+                  <a:schemeClr val="tx2"/>
+                </a:solidFill>
+                <a:latin typeface="Consolas" panose="020B0609020204030204" pitchFamily="49" charset="0"/>
+                <a:cs typeface="Consolas" panose="020B0609020204030204" pitchFamily="49" charset="0"/>
+              </a:rPr>
+              <a:t> condition which is executed only once</a:t>
+            </a:r>
+          </a:p>
+          <a:p>
+            <a:pPr lvl="1"/>
+            <a:endParaRPr lang="en-US" dirty="0">
+              <a:solidFill>
+                <a:schemeClr val="tx2"/>
+              </a:solidFill>
+              <a:latin typeface="Consolas" panose="020B0609020204030204" pitchFamily="49" charset="0"/>
+              <a:cs typeface="Consolas" panose="020B0609020204030204" pitchFamily="49" charset="0"/>
+            </a:endParaRPr>
+          </a:p>
+          <a:p>
+            <a:r>
+              <a:rPr lang="en-US" dirty="0">
+                <a:solidFill>
+                  <a:schemeClr val="tx2"/>
+                </a:solidFill>
+                <a:latin typeface="Consolas" panose="020B0609020204030204" pitchFamily="49" charset="0"/>
+                <a:cs typeface="Consolas" panose="020B0609020204030204" pitchFamily="49" charset="0"/>
+              </a:rPr>
+              <a:t>condition, in above </a:t>
+            </a:r>
+            <a:r>
+              <a:rPr lang="en-US" i="1" dirty="0">
+                <a:solidFill>
+                  <a:schemeClr val="tx2"/>
+                </a:solidFill>
+                <a:latin typeface="Consolas" panose="020B0609020204030204" pitchFamily="49" charset="0"/>
+                <a:cs typeface="Consolas" panose="020B0609020204030204" pitchFamily="49" charset="0"/>
+              </a:rPr>
+              <a:t>expressions</a:t>
+            </a:r>
+            <a:r>
+              <a:rPr lang="en-US" dirty="0">
+                <a:solidFill>
+                  <a:schemeClr val="tx2"/>
+                </a:solidFill>
+                <a:latin typeface="Consolas" panose="020B0609020204030204" pitchFamily="49" charset="0"/>
+                <a:cs typeface="Consolas" panose="020B0609020204030204" pitchFamily="49" charset="0"/>
+              </a:rPr>
+              <a:t>, ought to evaluate to a </a:t>
+            </a:r>
+            <a:r>
+              <a:rPr lang="en-US" i="1" dirty="0">
+                <a:solidFill>
+                  <a:schemeClr val="tx2"/>
+                </a:solidFill>
+                <a:latin typeface="Consolas" panose="020B0609020204030204" pitchFamily="49" charset="0"/>
+                <a:cs typeface="Consolas" panose="020B0609020204030204" pitchFamily="49" charset="0"/>
+              </a:rPr>
+              <a:t>boolean data-type</a:t>
+            </a:r>
+            <a:endParaRPr lang="en-US" i="1" dirty="0">
+              <a:solidFill>
+                <a:schemeClr val="tx2"/>
+              </a:solidFill>
+            </a:endParaRPr>
+          </a:p>
+          <a:p>
+            <a:pPr lvl="1"/>
+            <a:endParaRPr lang="en-US" dirty="0">
+              <a:solidFill>
+                <a:schemeClr val="tx2"/>
+              </a:solidFill>
+            </a:endParaRPr>
+          </a:p>
+          <a:p>
+            <a:pPr lvl="1"/>
+            <a:endParaRPr lang="en-US" dirty="0">
+              <a:solidFill>
+                <a:schemeClr val="tx2"/>
+              </a:solidFill>
+            </a:endParaRPr>
+          </a:p>
+        </p:txBody>
+      </p:sp>
+    </p:spTree>
+    <p:extLst>
+      <p:ext uri="{BB962C8B-B14F-4D97-AF65-F5344CB8AC3E}">
+        <p14:creationId xmlns:p14="http://schemas.microsoft.com/office/powerpoint/2010/main" val="1269644968"/>
+      </p:ext>
+    </p:extLst>
+  </p:cSld>
+  <p:clrMapOvr>
+    <a:masterClrMapping/>
+  </p:clrMapOvr>
+</p:sld>
+</file>
+
+<file path=ppt/slides/slide4.xml><?xml version="1.0" encoding="utf-8"?>
+<p:sld xmlns:a="http://schemas.openxmlformats.org/drawingml/2006/main" xmlns:r="http://schemas.openxmlformats.org/officeDocument/2006/relationships" xmlns:p="http://schemas.openxmlformats.org/presentationml/2006/main">
+  <p:cSld>
     <p:spTree>
       <p:nvGrpSpPr>
         <p:cNvPr id="1" name=""/>
@@ -11589,7 +11748,7 @@
 </p:sld>
 </file>
 
-<file path=ppt/slides/slide4.xml><?xml version="1.0" encoding="utf-8"?>
+<file path=ppt/slides/slide5.xml><?xml version="1.0" encoding="utf-8"?>
 <p:sld xmlns:a="http://schemas.openxmlformats.org/drawingml/2006/main" xmlns:r="http://schemas.openxmlformats.org/officeDocument/2006/relationships" xmlns:p="http://schemas.openxmlformats.org/presentationml/2006/main">
   <p:cSld>
     <p:bg>
@@ -11813,7 +11972,7 @@
 </p:sld>
 </file>
 
-<file path=ppt/slides/slide5.xml><?xml version="1.0" encoding="utf-8"?>
+<file path=ppt/slides/slide6.xml><?xml version="1.0" encoding="utf-8"?>
 <p:sld xmlns:a="http://schemas.openxmlformats.org/drawingml/2006/main" xmlns:r="http://schemas.openxmlformats.org/officeDocument/2006/relationships" xmlns:p="http://schemas.openxmlformats.org/presentationml/2006/main">
   <p:cSld>
     <p:spTree>
@@ -11934,7 +12093,7 @@
 </p:sld>
 </file>
 
-<file path=ppt/slides/slide6.xml><?xml version="1.0" encoding="utf-8"?>
+<file path=ppt/slides/slide7.xml><?xml version="1.0" encoding="utf-8"?>
 <p:sld xmlns:a="http://schemas.openxmlformats.org/drawingml/2006/main" xmlns:r="http://schemas.openxmlformats.org/officeDocument/2006/relationships" xmlns:p="http://schemas.openxmlformats.org/presentationml/2006/main">
   <p:cSld>
     <p:bg>
@@ -12092,7 +12251,7 @@
 </p:sld>
 </file>
 
-<file path=ppt/slides/slide7.xml><?xml version="1.0" encoding="utf-8"?>
+<file path=ppt/slides/slide8.xml><?xml version="1.0" encoding="utf-8"?>
 <p:sld xmlns:a="http://schemas.openxmlformats.org/drawingml/2006/main" xmlns:r="http://schemas.openxmlformats.org/officeDocument/2006/relationships" xmlns:p="http://schemas.openxmlformats.org/presentationml/2006/main">
   <p:cSld>
     <p:spTree>
@@ -12181,20 +12340,34 @@
           </a:p>
           <a:p>
             <a:r>
+              <a:rPr lang="en-US" dirty="0">
+                <a:latin typeface="Consolas" panose="020B0609020204030204" pitchFamily="49" charset="0"/>
+                <a:cs typeface="Consolas" panose="020B0609020204030204" pitchFamily="49" charset="0"/>
+              </a:rPr>
+              <a:t>float</a:t>
+            </a:r>
+            <a:r>
               <a:rPr lang="en-US" i="1" dirty="0">
                 <a:latin typeface="Consolas" panose="020B0609020204030204" pitchFamily="49" charset="0"/>
                 <a:cs typeface="Consolas" panose="020B0609020204030204" pitchFamily="49" charset="0"/>
               </a:rPr>
-              <a:t>float	</a:t>
-            </a:r>
-          </a:p>
-          <a:p>
+              <a:t>	</a:t>
+            </a:r>
+          </a:p>
+          <a:p>
+            <a:r>
+              <a:rPr lang="en-US" dirty="0">
+                <a:latin typeface="Consolas" panose="020B0609020204030204" pitchFamily="49" charset="0"/>
+                <a:cs typeface="Consolas" panose="020B0609020204030204" pitchFamily="49" charset="0"/>
+              </a:rPr>
+              <a:t>complex</a:t>
+            </a:r>
             <a:r>
               <a:rPr lang="en-US" i="1" dirty="0">
                 <a:latin typeface="Consolas" panose="020B0609020204030204" pitchFamily="49" charset="0"/>
                 <a:cs typeface="Consolas" panose="020B0609020204030204" pitchFamily="49" charset="0"/>
               </a:rPr>
-              <a:t>complex	</a:t>
+              <a:t>	</a:t>
             </a:r>
           </a:p>
           <a:p>
@@ -12220,7 +12393,7 @@
             </a:r>
             <a:r>
               <a:rPr lang="en-US" dirty="0"/>
-              <a:t> element of respective type</a:t>
+              <a:t> element of respective type (scalar types)</a:t>
             </a:r>
           </a:p>
         </p:txBody>
@@ -12317,7 +12490,7 @@
 </p:sld>
 </file>
 
-<file path=ppt/slides/slide8.xml><?xml version="1.0" encoding="utf-8"?>
+<file path=ppt/slides/slide9.xml><?xml version="1.0" encoding="utf-8"?>
 <p:sld xmlns:a="http://schemas.openxmlformats.org/drawingml/2006/main" xmlns:r="http://schemas.openxmlformats.org/officeDocument/2006/relationships" xmlns:p="http://schemas.openxmlformats.org/presentationml/2006/main">
   <p:cSld>
     <p:spTree>
@@ -12427,165 +12600,6 @@
   </p:cSld>
   <p:clrMapOvr>
     <a:masterClrMapping/>
-  </p:clrMapOvr>
-</p:sld>
-</file>
-
-<file path=ppt/slides/slide9.xml><?xml version="1.0" encoding="utf-8"?>
-<p:sld xmlns:a="http://schemas.openxmlformats.org/drawingml/2006/main" xmlns:r="http://schemas.openxmlformats.org/officeDocument/2006/relationships" xmlns:p="http://schemas.openxmlformats.org/presentationml/2006/main">
-  <p:cSld>
-    <p:bg>
-      <p:bgPr>
-        <a:solidFill>
-          <a:schemeClr val="tx1"/>
-        </a:solidFill>
-        <a:effectLst/>
-      </p:bgPr>
-    </p:bg>
-    <p:spTree>
-      <p:nvGrpSpPr>
-        <p:cNvPr id="1" name=""/>
-        <p:cNvGrpSpPr/>
-        <p:nvPr/>
-      </p:nvGrpSpPr>
-      <p:grpSpPr>
-        <a:xfrm>
-          <a:off x="0" y="0"/>
-          <a:ext cx="0" cy="0"/>
-          <a:chOff x="0" y="0"/>
-          <a:chExt cx="0" cy="0"/>
-        </a:xfrm>
-      </p:grpSpPr>
-      <p:sp>
-        <p:nvSpPr>
-          <p:cNvPr id="2" name="Title 1">
-            <a:extLst>
-              <a:ext uri="{FF2B5EF4-FFF2-40B4-BE49-F238E27FC236}">
-                <a16:creationId xmlns:a16="http://schemas.microsoft.com/office/drawing/2014/main" id="{43B35290-B2B6-324B-9349-4E6692E228FE}"/>
-              </a:ext>
-            </a:extLst>
-          </p:cNvPr>
-          <p:cNvSpPr>
-            <a:spLocks noGrp="1"/>
-          </p:cNvSpPr>
-          <p:nvPr>
-            <p:ph type="ctrTitle"/>
-          </p:nvPr>
-        </p:nvSpPr>
-        <p:spPr/>
-        <p:txBody>
-          <a:bodyPr>
-            <a:normAutofit/>
-          </a:bodyPr>
-          <a:lstStyle/>
-          <a:p>
-            <a:r>
-              <a:rPr lang="en-US" sz="5400" cap="none" dirty="0">
-                <a:solidFill>
-                  <a:schemeClr val="bg2">
-                    <a:lumMod val="75000"/>
-                  </a:schemeClr>
-                </a:solidFill>
-              </a:rPr>
-              <a:t>Introduction to programming  (Python)</a:t>
-            </a:r>
-          </a:p>
-        </p:txBody>
-      </p:sp>
-      <p:sp>
-        <p:nvSpPr>
-          <p:cNvPr id="3" name="Subtitle 2">
-            <a:extLst>
-              <a:ext uri="{FF2B5EF4-FFF2-40B4-BE49-F238E27FC236}">
-                <a16:creationId xmlns:a16="http://schemas.microsoft.com/office/drawing/2014/main" id="{E992A13E-D2BD-D347-B675-8C3054F4BE1E}"/>
-              </a:ext>
-            </a:extLst>
-          </p:cNvPr>
-          <p:cNvSpPr>
-            <a:spLocks noGrp="1"/>
-          </p:cNvSpPr>
-          <p:nvPr>
-            <p:ph type="subTitle" idx="1"/>
-          </p:nvPr>
-        </p:nvSpPr>
-        <p:spPr/>
-        <p:txBody>
-          <a:bodyPr anchor="ctr">
-            <a:normAutofit/>
-          </a:bodyPr>
-          <a:lstStyle/>
-          <a:p>
-            <a:pPr>
-              <a:spcAft>
-                <a:spcPts val="600"/>
-              </a:spcAft>
-            </a:pPr>
-            <a:r>
-              <a:rPr lang="en-US" sz="2000" cap="none" dirty="0">
-                <a:solidFill>
-                  <a:schemeClr val="bg2">
-                    <a:lumMod val="75000"/>
-                  </a:schemeClr>
-                </a:solidFill>
-              </a:rPr>
-              <a:t>Session</a:t>
-            </a:r>
-            <a:r>
-              <a:rPr lang="en-US" sz="2000" dirty="0">
-                <a:solidFill>
-                  <a:schemeClr val="bg2">
-                    <a:lumMod val="75000"/>
-                  </a:schemeClr>
-                </a:solidFill>
-              </a:rPr>
-              <a:t> #4</a:t>
-            </a:r>
-          </a:p>
-          <a:p>
-            <a:pPr>
-              <a:spcAft>
-                <a:spcPts val="600"/>
-              </a:spcAft>
-            </a:pPr>
-            <a:r>
-              <a:rPr lang="en-US" sz="2000" dirty="0">
-                <a:solidFill>
-                  <a:schemeClr val="bg2">
-                    <a:lumMod val="75000"/>
-                  </a:schemeClr>
-                </a:solidFill>
-              </a:rPr>
-              <a:t>Conditionals</a:t>
-            </a:r>
-            <a:r>
-              <a:rPr lang="en-US" sz="2000">
-                <a:solidFill>
-                  <a:schemeClr val="bg2">
-                    <a:lumMod val="75000"/>
-                  </a:schemeClr>
-                </a:solidFill>
-              </a:rPr>
-              <a:t>, Character, String</a:t>
-            </a:r>
-            <a:endParaRPr lang="en-US" sz="2000" dirty="0">
-              <a:solidFill>
-                <a:schemeClr val="bg2">
-                  <a:lumMod val="75000"/>
-                </a:schemeClr>
-              </a:solidFill>
-            </a:endParaRPr>
-          </a:p>
-        </p:txBody>
-      </p:sp>
-    </p:spTree>
-    <p:extLst>
-      <p:ext uri="{BB962C8B-B14F-4D97-AF65-F5344CB8AC3E}">
-        <p14:creationId xmlns:p14="http://schemas.microsoft.com/office/powerpoint/2010/main" val="1904483027"/>
-      </p:ext>
-    </p:extLst>
-  </p:cSld>
-  <p:clrMapOvr>
-    <a:overrideClrMapping bg1="dk1" tx1="lt1" bg2="dk2" tx2="lt2" accent1="accent1" accent2="accent2" accent3="accent3" accent4="accent4" accent5="accent5" accent6="accent6" hlink="hlink" folHlink="folHlink"/>
   </p:clrMapOvr>
 </p:sld>
 </file>

</xml_diff>